<commit_message>
more work done in presentation
</commit_message>
<xml_diff>
--- a/hash_table_presentation/hashing.pptx
+++ b/hash_table_presentation/hashing.pptx
@@ -300,7 +300,7 @@
           <a:p>
             <a:fld id="{B63B952D-58BF-4557-ACCB-77351F743635}" type="datetimeFigureOut">
               <a:rPr lang="en-IN" smtClean="0"/>
-              <a:t>05-12-2023</a:t>
+              <a:t>07-12-2023</a:t>
             </a:fld>
             <a:endParaRPr lang="en-IN"/>
           </a:p>
@@ -500,7 +500,7 @@
           <a:p>
             <a:fld id="{B63B952D-58BF-4557-ACCB-77351F743635}" type="datetimeFigureOut">
               <a:rPr lang="en-IN" smtClean="0"/>
-              <a:t>05-12-2023</a:t>
+              <a:t>07-12-2023</a:t>
             </a:fld>
             <a:endParaRPr lang="en-IN"/>
           </a:p>
@@ -710,7 +710,7 @@
           <a:p>
             <a:fld id="{B63B952D-58BF-4557-ACCB-77351F743635}" type="datetimeFigureOut">
               <a:rPr lang="en-IN" smtClean="0"/>
-              <a:t>05-12-2023</a:t>
+              <a:t>07-12-2023</a:t>
             </a:fld>
             <a:endParaRPr lang="en-IN"/>
           </a:p>
@@ -910,7 +910,7 @@
           <a:p>
             <a:fld id="{B63B952D-58BF-4557-ACCB-77351F743635}" type="datetimeFigureOut">
               <a:rPr lang="en-IN" smtClean="0"/>
-              <a:t>05-12-2023</a:t>
+              <a:t>07-12-2023</a:t>
             </a:fld>
             <a:endParaRPr lang="en-IN"/>
           </a:p>
@@ -1186,7 +1186,7 @@
           <a:p>
             <a:fld id="{B63B952D-58BF-4557-ACCB-77351F743635}" type="datetimeFigureOut">
               <a:rPr lang="en-IN" smtClean="0"/>
-              <a:t>05-12-2023</a:t>
+              <a:t>07-12-2023</a:t>
             </a:fld>
             <a:endParaRPr lang="en-IN"/>
           </a:p>
@@ -1454,7 +1454,7 @@
           <a:p>
             <a:fld id="{B63B952D-58BF-4557-ACCB-77351F743635}" type="datetimeFigureOut">
               <a:rPr lang="en-IN" smtClean="0"/>
-              <a:t>05-12-2023</a:t>
+              <a:t>07-12-2023</a:t>
             </a:fld>
             <a:endParaRPr lang="en-IN"/>
           </a:p>
@@ -1869,7 +1869,7 @@
           <a:p>
             <a:fld id="{B63B952D-58BF-4557-ACCB-77351F743635}" type="datetimeFigureOut">
               <a:rPr lang="en-IN" smtClean="0"/>
-              <a:t>05-12-2023</a:t>
+              <a:t>07-12-2023</a:t>
             </a:fld>
             <a:endParaRPr lang="en-IN"/>
           </a:p>
@@ -2011,7 +2011,7 @@
           <a:p>
             <a:fld id="{B63B952D-58BF-4557-ACCB-77351F743635}" type="datetimeFigureOut">
               <a:rPr lang="en-IN" smtClean="0"/>
-              <a:t>05-12-2023</a:t>
+              <a:t>07-12-2023</a:t>
             </a:fld>
             <a:endParaRPr lang="en-IN"/>
           </a:p>
@@ -2124,7 +2124,7 @@
           <a:p>
             <a:fld id="{B63B952D-58BF-4557-ACCB-77351F743635}" type="datetimeFigureOut">
               <a:rPr lang="en-IN" smtClean="0"/>
-              <a:t>05-12-2023</a:t>
+              <a:t>07-12-2023</a:t>
             </a:fld>
             <a:endParaRPr lang="en-IN"/>
           </a:p>
@@ -2437,7 +2437,7 @@
           <a:p>
             <a:fld id="{B63B952D-58BF-4557-ACCB-77351F743635}" type="datetimeFigureOut">
               <a:rPr lang="en-IN" smtClean="0"/>
-              <a:t>05-12-2023</a:t>
+              <a:t>07-12-2023</a:t>
             </a:fld>
             <a:endParaRPr lang="en-IN"/>
           </a:p>
@@ -2726,7 +2726,7 @@
           <a:p>
             <a:fld id="{B63B952D-58BF-4557-ACCB-77351F743635}" type="datetimeFigureOut">
               <a:rPr lang="en-IN" smtClean="0"/>
-              <a:t>05-12-2023</a:t>
+              <a:t>07-12-2023</a:t>
             </a:fld>
             <a:endParaRPr lang="en-IN"/>
           </a:p>
@@ -2969,7 +2969,7 @@
           <a:p>
             <a:fld id="{B63B952D-58BF-4557-ACCB-77351F743635}" type="datetimeFigureOut">
               <a:rPr lang="en-IN" smtClean="0"/>
-              <a:t>05-12-2023</a:t>
+              <a:t>07-12-2023</a:t>
             </a:fld>
             <a:endParaRPr lang="en-IN"/>
           </a:p>
@@ -26302,6 +26302,16 @@
               <a:buNone/>
             </a:pPr>
             <a:r>
+              <a:rPr lang="en-US" sz="1800" b="0" dirty="0" err="1">
+                <a:solidFill>
+                  <a:srgbClr val="0000FF"/>
+                </a:solidFill>
+                <a:effectLst/>
+                <a:latin typeface="Cascadia Mono" panose="020B0609020000020004" pitchFamily="49" charset="0"/>
+              </a:rPr>
+              <a:t>division_method</a:t>
+            </a:r>
+            <a:r>
               <a:rPr lang="en-US" sz="1800" b="0" dirty="0">
                 <a:solidFill>
                   <a:srgbClr val="0000FF"/>
@@ -26309,263 +26319,29 @@
                 <a:effectLst/>
                 <a:latin typeface="Cascadia Mono" panose="020B0609020000020004" pitchFamily="49" charset="0"/>
               </a:rPr>
-              <a:t>int</a:t>
-            </a:r>
-            <a:r>
-              <a:rPr lang="en-US" sz="1800" b="0" dirty="0">
-                <a:solidFill>
-                  <a:srgbClr val="000000"/>
-                </a:solidFill>
-                <a:effectLst/>
-                <a:latin typeface="Cascadia Mono" panose="020B0609020000020004" pitchFamily="49" charset="0"/>
-              </a:rPr>
-              <a:t> </a:t>
-            </a:r>
-            <a:r>
-              <a:rPr lang="en-US" sz="1800" b="0" dirty="0" err="1">
-                <a:solidFill>
-                  <a:srgbClr val="795E26"/>
-                </a:solidFill>
-                <a:effectLst/>
-                <a:latin typeface="Cascadia Mono" panose="020B0609020000020004" pitchFamily="49" charset="0"/>
-              </a:rPr>
-              <a:t>division_method</a:t>
-            </a:r>
-            <a:r>
-              <a:rPr lang="en-US" sz="1800" b="0" dirty="0">
-                <a:solidFill>
-                  <a:srgbClr val="000000"/>
-                </a:solidFill>
-                <a:effectLst/>
-                <a:latin typeface="Cascadia Mono" panose="020B0609020000020004" pitchFamily="49" charset="0"/>
-              </a:rPr>
-              <a:t>(</a:t>
-            </a:r>
-            <a:r>
-              <a:rPr lang="en-US" sz="1800" b="0" dirty="0">
+              <a:t>: key</a:t>
+            </a:r>
+          </a:p>
+          <a:p>
+            <a:pPr marL="0" indent="0">
+              <a:buNone/>
+            </a:pPr>
+            <a:r>
+              <a:rPr lang="en-US" sz="1800" dirty="0">
                 <a:solidFill>
                   <a:srgbClr val="0000FF"/>
                 </a:solidFill>
-                <a:effectLst/>
-                <a:latin typeface="Cascadia Mono" panose="020B0609020000020004" pitchFamily="49" charset="0"/>
-              </a:rPr>
-              <a:t>int</a:t>
-            </a:r>
-            <a:r>
-              <a:rPr lang="en-US" sz="1800" b="0" dirty="0">
-                <a:solidFill>
-                  <a:srgbClr val="000000"/>
-                </a:solidFill>
-                <a:effectLst/>
-                <a:latin typeface="Cascadia Mono" panose="020B0609020000020004" pitchFamily="49" charset="0"/>
-              </a:rPr>
-              <a:t> </a:t>
-            </a:r>
-            <a:r>
-              <a:rPr lang="en-US" sz="1800" b="0" dirty="0">
-                <a:solidFill>
-                  <a:srgbClr val="001080"/>
-                </a:solidFill>
-                <a:effectLst/>
-                <a:latin typeface="Cascadia Mono" panose="020B0609020000020004" pitchFamily="49" charset="0"/>
-              </a:rPr>
-              <a:t>key</a:t>
-            </a:r>
-            <a:r>
-              <a:rPr lang="en-US" sz="1800" b="0" dirty="0">
-                <a:solidFill>
-                  <a:srgbClr val="000000"/>
-                </a:solidFill>
-                <a:effectLst/>
-                <a:latin typeface="Cascadia Mono" panose="020B0609020000020004" pitchFamily="49" charset="0"/>
-              </a:rPr>
-              <a:t>) {</a:t>
-            </a:r>
-          </a:p>
-          <a:p>
-            <a:pPr marL="0" indent="0">
-              <a:buNone/>
-            </a:pPr>
-            <a:r>
-              <a:rPr lang="en-US" sz="1800" b="0" dirty="0">
-                <a:solidFill>
-                  <a:srgbClr val="000000"/>
-                </a:solidFill>
-                <a:effectLst/>
-                <a:latin typeface="Cascadia Mono" panose="020B0609020000020004" pitchFamily="49" charset="0"/>
-              </a:rPr>
-              <a:t>    </a:t>
-            </a:r>
-            <a:r>
-              <a:rPr lang="en-US" sz="1800" b="0" dirty="0">
-                <a:solidFill>
-                  <a:srgbClr val="0000FF"/>
-                </a:solidFill>
-                <a:effectLst/>
-                <a:latin typeface="Cascadia Mono" panose="020B0609020000020004" pitchFamily="49" charset="0"/>
-              </a:rPr>
-              <a:t>const</a:t>
-            </a:r>
-            <a:r>
-              <a:rPr lang="en-US" sz="1800" b="0" dirty="0">
-                <a:solidFill>
-                  <a:srgbClr val="000000"/>
-                </a:solidFill>
-                <a:effectLst/>
-                <a:latin typeface="Cascadia Mono" panose="020B0609020000020004" pitchFamily="49" charset="0"/>
-              </a:rPr>
-              <a:t> </a:t>
-            </a:r>
-            <a:r>
-              <a:rPr lang="en-US" sz="1800" b="0" dirty="0">
-                <a:solidFill>
-                  <a:srgbClr val="0000FF"/>
-                </a:solidFill>
-                <a:effectLst/>
-                <a:latin typeface="Cascadia Mono" panose="020B0609020000020004" pitchFamily="49" charset="0"/>
-              </a:rPr>
-              <a:t>int</a:t>
-            </a:r>
-            <a:r>
-              <a:rPr lang="en-US" sz="1800" b="0" dirty="0">
-                <a:solidFill>
-                  <a:srgbClr val="000000"/>
-                </a:solidFill>
-                <a:effectLst/>
-                <a:latin typeface="Cascadia Mono" panose="020B0609020000020004" pitchFamily="49" charset="0"/>
-              </a:rPr>
-              <a:t> </a:t>
-            </a:r>
-            <a:r>
-              <a:rPr lang="en-US" sz="1800" b="0" dirty="0">
-                <a:solidFill>
-                  <a:srgbClr val="001080"/>
-                </a:solidFill>
-                <a:effectLst/>
-                <a:latin typeface="Cascadia Mono" panose="020B0609020000020004" pitchFamily="49" charset="0"/>
-              </a:rPr>
-              <a:t>m</a:t>
-            </a:r>
-            <a:r>
-              <a:rPr lang="en-US" sz="1800" b="0" dirty="0">
-                <a:solidFill>
-                  <a:srgbClr val="000000"/>
-                </a:solidFill>
-                <a:effectLst/>
-                <a:latin typeface="Cascadia Mono" panose="020B0609020000020004" pitchFamily="49" charset="0"/>
-              </a:rPr>
-              <a:t> = </a:t>
-            </a:r>
-            <a:r>
-              <a:rPr lang="en-US" sz="1800" b="0" dirty="0">
-                <a:solidFill>
-                  <a:srgbClr val="098658"/>
-                </a:solidFill>
-                <a:effectLst/>
-                <a:latin typeface="Cascadia Mono" panose="020B0609020000020004" pitchFamily="49" charset="0"/>
-              </a:rPr>
-              <a:t>29</a:t>
-            </a:r>
-            <a:r>
-              <a:rPr lang="en-US" sz="1800" b="0" dirty="0">
-                <a:solidFill>
-                  <a:srgbClr val="000000"/>
-                </a:solidFill>
-                <a:effectLst/>
-                <a:latin typeface="Cascadia Mono" panose="020B0609020000020004" pitchFamily="49" charset="0"/>
-              </a:rPr>
-              <a:t>;</a:t>
-            </a:r>
-          </a:p>
-          <a:p>
-            <a:pPr marL="0" indent="0">
-              <a:buNone/>
-            </a:pPr>
-            <a:r>
-              <a:rPr lang="en-US" sz="1800" b="0" dirty="0">
-                <a:solidFill>
-                  <a:srgbClr val="000000"/>
-                </a:solidFill>
-                <a:effectLst/>
-                <a:latin typeface="Cascadia Mono" panose="020B0609020000020004" pitchFamily="49" charset="0"/>
-              </a:rPr>
-              <a:t>    </a:t>
-            </a:r>
-            <a:r>
-              <a:rPr lang="en-US" sz="1800" b="0" dirty="0">
-                <a:solidFill>
-                  <a:srgbClr val="AF00DB"/>
-                </a:solidFill>
-                <a:effectLst/>
-                <a:latin typeface="Cascadia Mono" panose="020B0609020000020004" pitchFamily="49" charset="0"/>
-              </a:rPr>
-              <a:t>return</a:t>
-            </a:r>
-            <a:r>
-              <a:rPr lang="en-US" sz="1800" b="0" dirty="0">
-                <a:solidFill>
-                  <a:srgbClr val="000000"/>
-                </a:solidFill>
-                <a:effectLst/>
-                <a:latin typeface="Cascadia Mono" panose="020B0609020000020004" pitchFamily="49" charset="0"/>
-              </a:rPr>
-              <a:t> </a:t>
-            </a:r>
-            <a:r>
-              <a:rPr lang="en-US" sz="1800" b="0" dirty="0">
-                <a:solidFill>
-                  <a:srgbClr val="001080"/>
-                </a:solidFill>
-                <a:effectLst/>
-                <a:latin typeface="Cascadia Mono" panose="020B0609020000020004" pitchFamily="49" charset="0"/>
-              </a:rPr>
-              <a:t>key</a:t>
-            </a:r>
-            <a:r>
-              <a:rPr lang="en-US" sz="1800" b="0" dirty="0">
-                <a:solidFill>
-                  <a:srgbClr val="000000"/>
-                </a:solidFill>
-                <a:effectLst/>
-                <a:latin typeface="Cascadia Mono" panose="020B0609020000020004" pitchFamily="49" charset="0"/>
-              </a:rPr>
-              <a:t> % </a:t>
-            </a:r>
-            <a:r>
-              <a:rPr lang="en-US" sz="1800" b="0" dirty="0">
-                <a:solidFill>
-                  <a:srgbClr val="001080"/>
-                </a:solidFill>
-                <a:effectLst/>
-                <a:latin typeface="Cascadia Mono" panose="020B0609020000020004" pitchFamily="49" charset="0"/>
-              </a:rPr>
-              <a:t>m</a:t>
-            </a:r>
-            <a:r>
-              <a:rPr lang="en-US" sz="1800" b="0" dirty="0">
-                <a:solidFill>
-                  <a:srgbClr val="000000"/>
-                </a:solidFill>
-                <a:effectLst/>
-                <a:latin typeface="Cascadia Mono" panose="020B0609020000020004" pitchFamily="49" charset="0"/>
-              </a:rPr>
-              <a:t>;</a:t>
-            </a:r>
-          </a:p>
-          <a:p>
-            <a:pPr marL="0" indent="0">
-              <a:buNone/>
-            </a:pPr>
-            <a:r>
-              <a:rPr lang="en-US" sz="1800" b="0" dirty="0">
-                <a:solidFill>
-                  <a:srgbClr val="000000"/>
-                </a:solidFill>
-                <a:effectLst/>
-                <a:latin typeface="Cascadia Mono" panose="020B0609020000020004" pitchFamily="49" charset="0"/>
-              </a:rPr>
-              <a:t>}</a:t>
-            </a:r>
+                <a:latin typeface="Cascadia Mono" panose="020B0609020000020004" pitchFamily="49" charset="0"/>
+              </a:rPr>
+              <a:t>1. Return key mod m.</a:t>
+            </a:r>
+            <a:endParaRPr lang="en-US" sz="1800" b="0" dirty="0">
+              <a:solidFill>
+                <a:srgbClr val="000000"/>
+              </a:solidFill>
+              <a:effectLst/>
+              <a:latin typeface="Cascadia Mono" panose="020B0609020000020004" pitchFamily="49" charset="0"/>
+            </a:endParaRPr>
           </a:p>
         </p:txBody>
       </p:sp>
@@ -26867,553 +26643,93 @@
               <a:buNone/>
             </a:pPr>
             <a:r>
-              <a:rPr lang="en-US" sz="1800" b="0" dirty="0">
+              <a:rPr lang="en-US" sz="1800" b="0" dirty="0" err="1">
                 <a:solidFill>
                   <a:srgbClr val="0000FF"/>
                 </a:solidFill>
                 <a:effectLst/>
                 <a:latin typeface="Cascadia Mono" panose="020B0609020000020004" pitchFamily="49" charset="0"/>
               </a:rPr>
-              <a:t>int</a:t>
-            </a:r>
-            <a:r>
-              <a:rPr lang="en-US" sz="1800" b="0" dirty="0">
-                <a:solidFill>
-                  <a:srgbClr val="000000"/>
-                </a:solidFill>
-                <a:effectLst/>
-                <a:latin typeface="Cascadia Mono" panose="020B0609020000020004" pitchFamily="49" charset="0"/>
-              </a:rPr>
-              <a:t> </a:t>
-            </a:r>
-            <a:r>
-              <a:rPr lang="en-US" sz="1800" b="0" dirty="0" err="1">
-                <a:solidFill>
-                  <a:srgbClr val="795E26"/>
-                </a:solidFill>
-                <a:effectLst/>
-                <a:latin typeface="Cascadia Mono" panose="020B0609020000020004" pitchFamily="49" charset="0"/>
-              </a:rPr>
               <a:t>multiplication_method</a:t>
             </a:r>
             <a:r>
-              <a:rPr lang="en-US" sz="1800" b="0" dirty="0">
-                <a:solidFill>
-                  <a:srgbClr val="000000"/>
-                </a:solidFill>
-                <a:effectLst/>
-                <a:latin typeface="Cascadia Mono" panose="020B0609020000020004" pitchFamily="49" charset="0"/>
-              </a:rPr>
-              <a:t>(</a:t>
-            </a:r>
-            <a:r>
-              <a:rPr lang="en-US" sz="1800" b="0" dirty="0">
+              <a:rPr lang="en-US" sz="1800" dirty="0">
                 <a:solidFill>
                   <a:srgbClr val="0000FF"/>
                 </a:solidFill>
-                <a:effectLst/>
-                <a:latin typeface="Cascadia Mono" panose="020B0609020000020004" pitchFamily="49" charset="0"/>
-              </a:rPr>
-              <a:t>int</a:t>
-            </a:r>
-            <a:r>
-              <a:rPr lang="en-US" sz="1800" b="0" dirty="0">
-                <a:solidFill>
-                  <a:srgbClr val="000000"/>
-                </a:solidFill>
-                <a:effectLst/>
-                <a:latin typeface="Cascadia Mono" panose="020B0609020000020004" pitchFamily="49" charset="0"/>
-              </a:rPr>
-              <a:t> </a:t>
-            </a:r>
-            <a:r>
-              <a:rPr lang="en-US" sz="1800" b="0" dirty="0">
-                <a:solidFill>
-                  <a:srgbClr val="001080"/>
-                </a:solidFill>
-                <a:effectLst/>
-                <a:latin typeface="Cascadia Mono" panose="020B0609020000020004" pitchFamily="49" charset="0"/>
-              </a:rPr>
-              <a:t>key</a:t>
-            </a:r>
-            <a:r>
-              <a:rPr lang="en-US" sz="1800" b="0" dirty="0">
-                <a:solidFill>
-                  <a:srgbClr val="000000"/>
-                </a:solidFill>
-                <a:effectLst/>
-                <a:latin typeface="Cascadia Mono" panose="020B0609020000020004" pitchFamily="49" charset="0"/>
-              </a:rPr>
-              <a:t>) {</a:t>
-            </a:r>
-          </a:p>
-          <a:p>
-            <a:pPr marL="0" indent="0">
-              <a:buNone/>
-            </a:pPr>
-            <a:r>
-              <a:rPr lang="en-US" sz="1800" b="0" dirty="0">
-                <a:solidFill>
-                  <a:srgbClr val="000000"/>
-                </a:solidFill>
-                <a:effectLst/>
-                <a:latin typeface="Cascadia Mono" panose="020B0609020000020004" pitchFamily="49" charset="0"/>
-              </a:rPr>
-              <a:t>    </a:t>
-            </a:r>
-            <a:r>
-              <a:rPr lang="en-US" sz="1800" b="0" dirty="0">
+                <a:latin typeface="Cascadia Mono" panose="020B0609020000020004" pitchFamily="49" charset="0"/>
+              </a:rPr>
+              <a:t>: key</a:t>
+            </a:r>
+          </a:p>
+          <a:p>
+            <a:pPr marL="0" indent="0">
+              <a:buNone/>
+            </a:pPr>
+            <a:r>
+              <a:rPr lang="en-US" sz="1800" dirty="0">
                 <a:solidFill>
                   <a:srgbClr val="0000FF"/>
                 </a:solidFill>
-                <a:effectLst/>
-                <a:latin typeface="Cascadia Mono" panose="020B0609020000020004" pitchFamily="49" charset="0"/>
-              </a:rPr>
-              <a:t>const</a:t>
-            </a:r>
-            <a:r>
-              <a:rPr lang="en-US" sz="1800" b="0" dirty="0">
-                <a:solidFill>
-                  <a:srgbClr val="000000"/>
-                </a:solidFill>
-                <a:effectLst/>
-                <a:latin typeface="Cascadia Mono" panose="020B0609020000020004" pitchFamily="49" charset="0"/>
-              </a:rPr>
-              <a:t> </a:t>
-            </a:r>
-            <a:r>
-              <a:rPr lang="en-US" sz="1800" b="0" dirty="0">
+                <a:latin typeface="Cascadia Mono" panose="020B0609020000020004" pitchFamily="49" charset="0"/>
+              </a:rPr>
+              <a:t>1. Find key * A.</a:t>
+            </a:r>
+          </a:p>
+          <a:p>
+            <a:pPr marL="0" indent="0">
+              <a:buNone/>
+            </a:pPr>
+            <a:r>
+              <a:rPr lang="en-US" sz="1800" dirty="0">
                 <a:solidFill>
                   <a:srgbClr val="0000FF"/>
                 </a:solidFill>
-                <a:effectLst/>
-                <a:latin typeface="Cascadia Mono" panose="020B0609020000020004" pitchFamily="49" charset="0"/>
-              </a:rPr>
-              <a:t>double</a:t>
-            </a:r>
-            <a:r>
-              <a:rPr lang="en-US" sz="1800" b="0" dirty="0">
-                <a:solidFill>
-                  <a:srgbClr val="000000"/>
-                </a:solidFill>
-                <a:effectLst/>
-                <a:latin typeface="Cascadia Mono" panose="020B0609020000020004" pitchFamily="49" charset="0"/>
-              </a:rPr>
-              <a:t> </a:t>
-            </a:r>
-            <a:r>
-              <a:rPr lang="en-US" sz="1800" b="0" dirty="0">
-                <a:solidFill>
-                  <a:srgbClr val="001080"/>
-                </a:solidFill>
-                <a:effectLst/>
-                <a:latin typeface="Cascadia Mono" panose="020B0609020000020004" pitchFamily="49" charset="0"/>
-              </a:rPr>
-              <a:t>A</a:t>
-            </a:r>
-            <a:r>
-              <a:rPr lang="en-US" sz="1800" b="0" dirty="0">
-                <a:solidFill>
-                  <a:srgbClr val="000000"/>
-                </a:solidFill>
-                <a:effectLst/>
-                <a:latin typeface="Cascadia Mono" panose="020B0609020000020004" pitchFamily="49" charset="0"/>
-              </a:rPr>
-              <a:t> = </a:t>
-            </a:r>
-            <a:r>
-              <a:rPr lang="en-US" sz="1800" b="0" dirty="0">
-                <a:solidFill>
-                  <a:srgbClr val="098658"/>
-                </a:solidFill>
-                <a:effectLst/>
-                <a:latin typeface="Cascadia Mono" panose="020B0609020000020004" pitchFamily="49" charset="0"/>
-              </a:rPr>
-              <a:t>0.6180339887</a:t>
-            </a:r>
-            <a:r>
-              <a:rPr lang="en-US" sz="1800" b="0" dirty="0">
-                <a:solidFill>
-                  <a:srgbClr val="000000"/>
-                </a:solidFill>
-                <a:effectLst/>
-                <a:latin typeface="Cascadia Mono" panose="020B0609020000020004" pitchFamily="49" charset="0"/>
-              </a:rPr>
-              <a:t>;</a:t>
-            </a:r>
-          </a:p>
-          <a:p>
-            <a:pPr marL="0" indent="0">
-              <a:buNone/>
-            </a:pPr>
-            <a:r>
-              <a:rPr lang="en-US" sz="1800" b="0" dirty="0">
-                <a:solidFill>
-                  <a:srgbClr val="000000"/>
-                </a:solidFill>
-                <a:effectLst/>
-                <a:latin typeface="Cascadia Mono" panose="020B0609020000020004" pitchFamily="49" charset="0"/>
-              </a:rPr>
-              <a:t>    </a:t>
-            </a:r>
-            <a:r>
-              <a:rPr lang="en-US" sz="1800" b="0" dirty="0">
+                <a:latin typeface="Cascadia Mono" panose="020B0609020000020004" pitchFamily="49" charset="0"/>
+              </a:rPr>
+              <a:t>2. Extract the part after the</a:t>
+            </a:r>
+          </a:p>
+          <a:p>
+            <a:pPr marL="0" indent="0">
+              <a:buNone/>
+            </a:pPr>
+            <a:r>
+              <a:rPr lang="en-US" sz="1800" dirty="0">
                 <a:solidFill>
                   <a:srgbClr val="0000FF"/>
                 </a:solidFill>
-                <a:effectLst/>
-                <a:latin typeface="Cascadia Mono" panose="020B0609020000020004" pitchFamily="49" charset="0"/>
-              </a:rPr>
-              <a:t>const</a:t>
-            </a:r>
-            <a:r>
-              <a:rPr lang="en-US" sz="1800" b="0" dirty="0">
-                <a:solidFill>
-                  <a:srgbClr val="000000"/>
-                </a:solidFill>
-                <a:effectLst/>
-                <a:latin typeface="Cascadia Mono" panose="020B0609020000020004" pitchFamily="49" charset="0"/>
-              </a:rPr>
-              <a:t> </a:t>
-            </a:r>
-            <a:r>
-              <a:rPr lang="en-US" sz="1800" b="0" dirty="0">
+                <a:latin typeface="Cascadia Mono" panose="020B0609020000020004" pitchFamily="49" charset="0"/>
+              </a:rPr>
+              <a:t>   floating point (:= extracted).</a:t>
+            </a:r>
+          </a:p>
+          <a:p>
+            <a:pPr marL="0" indent="0">
+              <a:buNone/>
+            </a:pPr>
+            <a:r>
+              <a:rPr lang="en-US" sz="1800" dirty="0">
                 <a:solidFill>
                   <a:srgbClr val="0000FF"/>
                 </a:solidFill>
-                <a:effectLst/>
-                <a:latin typeface="Cascadia Mono" panose="020B0609020000020004" pitchFamily="49" charset="0"/>
-              </a:rPr>
-              <a:t>int</a:t>
-            </a:r>
-            <a:r>
-              <a:rPr lang="en-US" sz="1800" b="0" dirty="0">
-                <a:solidFill>
-                  <a:srgbClr val="000000"/>
-                </a:solidFill>
-                <a:effectLst/>
-                <a:latin typeface="Cascadia Mono" panose="020B0609020000020004" pitchFamily="49" charset="0"/>
-              </a:rPr>
-              <a:t> </a:t>
-            </a:r>
-            <a:r>
-              <a:rPr lang="en-US" sz="1800" b="0" dirty="0">
-                <a:solidFill>
-                  <a:srgbClr val="001080"/>
-                </a:solidFill>
-                <a:effectLst/>
-                <a:latin typeface="Cascadia Mono" panose="020B0609020000020004" pitchFamily="49" charset="0"/>
-              </a:rPr>
-              <a:t>m</a:t>
-            </a:r>
-            <a:r>
-              <a:rPr lang="en-US" sz="1800" b="0" dirty="0">
-                <a:solidFill>
-                  <a:srgbClr val="000000"/>
-                </a:solidFill>
-                <a:effectLst/>
-                <a:latin typeface="Cascadia Mono" panose="020B0609020000020004" pitchFamily="49" charset="0"/>
-              </a:rPr>
-              <a:t> = </a:t>
-            </a:r>
-            <a:r>
-              <a:rPr lang="en-US" sz="1800" b="0" dirty="0">
-                <a:solidFill>
-                  <a:srgbClr val="098658"/>
-                </a:solidFill>
-                <a:effectLst/>
-                <a:latin typeface="Cascadia Mono" panose="020B0609020000020004" pitchFamily="49" charset="0"/>
-              </a:rPr>
-              <a:t>60</a:t>
-            </a:r>
-            <a:r>
-              <a:rPr lang="en-US" sz="1800" b="0" dirty="0">
-                <a:solidFill>
-                  <a:srgbClr val="000000"/>
-                </a:solidFill>
-                <a:effectLst/>
-                <a:latin typeface="Cascadia Mono" panose="020B0609020000020004" pitchFamily="49" charset="0"/>
-              </a:rPr>
-              <a:t>;</a:t>
-            </a:r>
-          </a:p>
-          <a:p>
-            <a:pPr marL="0" indent="0">
-              <a:buNone/>
-            </a:pPr>
-            <a:r>
-              <a:rPr lang="en-US" sz="1800" b="0" dirty="0">
-                <a:solidFill>
-                  <a:srgbClr val="000000"/>
-                </a:solidFill>
-                <a:effectLst/>
-                <a:latin typeface="Cascadia Mono" panose="020B0609020000020004" pitchFamily="49" charset="0"/>
-              </a:rPr>
-              <a:t>    </a:t>
-            </a:r>
-            <a:r>
-              <a:rPr lang="en-US" sz="1800" b="0" dirty="0">
+                <a:latin typeface="Cascadia Mono" panose="020B0609020000020004" pitchFamily="49" charset="0"/>
+              </a:rPr>
+              <a:t>3. Return the integer part of</a:t>
+            </a:r>
+          </a:p>
+          <a:p>
+            <a:pPr marL="0" indent="0">
+              <a:buNone/>
+            </a:pPr>
+            <a:r>
+              <a:rPr lang="en-US" sz="1800" dirty="0">
                 <a:solidFill>
                   <a:srgbClr val="0000FF"/>
                 </a:solidFill>
-                <a:effectLst/>
-                <a:latin typeface="Cascadia Mono" panose="020B0609020000020004" pitchFamily="49" charset="0"/>
-              </a:rPr>
-              <a:t>double</a:t>
-            </a:r>
-            <a:r>
-              <a:rPr lang="en-US" sz="1800" b="0" dirty="0">
-                <a:solidFill>
-                  <a:srgbClr val="000000"/>
-                </a:solidFill>
-                <a:effectLst/>
-                <a:latin typeface="Cascadia Mono" panose="020B0609020000020004" pitchFamily="49" charset="0"/>
-              </a:rPr>
-              <a:t> </a:t>
-            </a:r>
-            <a:r>
-              <a:rPr lang="en-US" sz="1800" b="0" dirty="0">
-                <a:solidFill>
-                  <a:srgbClr val="001080"/>
-                </a:solidFill>
-                <a:effectLst/>
-                <a:latin typeface="Cascadia Mono" panose="020B0609020000020004" pitchFamily="49" charset="0"/>
-              </a:rPr>
-              <a:t>extracted</a:t>
-            </a:r>
-            <a:r>
-              <a:rPr lang="en-US" sz="1800" b="0" dirty="0">
-                <a:solidFill>
-                  <a:srgbClr val="000000"/>
-                </a:solidFill>
-                <a:effectLst/>
-                <a:latin typeface="Cascadia Mono" panose="020B0609020000020004" pitchFamily="49" charset="0"/>
-              </a:rPr>
-              <a:t> = </a:t>
-            </a:r>
-            <a:r>
-              <a:rPr lang="en-US" sz="1800" b="0" dirty="0">
-                <a:solidFill>
-                  <a:srgbClr val="001080"/>
-                </a:solidFill>
-                <a:effectLst/>
-                <a:latin typeface="Cascadia Mono" panose="020B0609020000020004" pitchFamily="49" charset="0"/>
-              </a:rPr>
-              <a:t>A</a:t>
-            </a:r>
-            <a:r>
-              <a:rPr lang="en-US" sz="1800" b="0" dirty="0">
-                <a:solidFill>
-                  <a:srgbClr val="000000"/>
-                </a:solidFill>
-                <a:effectLst/>
-                <a:latin typeface="Cascadia Mono" panose="020B0609020000020004" pitchFamily="49" charset="0"/>
-              </a:rPr>
-              <a:t>*</a:t>
-            </a:r>
-            <a:r>
-              <a:rPr lang="en-US" sz="1800" b="0" dirty="0">
-                <a:solidFill>
-                  <a:srgbClr val="001080"/>
-                </a:solidFill>
-                <a:effectLst/>
-                <a:latin typeface="Cascadia Mono" panose="020B0609020000020004" pitchFamily="49" charset="0"/>
-              </a:rPr>
-              <a:t>key</a:t>
-            </a:r>
-            <a:r>
-              <a:rPr lang="en-US" sz="1800" b="0" dirty="0">
-                <a:solidFill>
-                  <a:srgbClr val="000000"/>
-                </a:solidFill>
-                <a:effectLst/>
-                <a:latin typeface="Cascadia Mono" panose="020B0609020000020004" pitchFamily="49" charset="0"/>
-              </a:rPr>
-              <a:t> –</a:t>
-            </a:r>
-          </a:p>
-          <a:p>
-            <a:pPr marL="0" indent="0">
-              <a:buNone/>
-            </a:pPr>
-            <a:r>
-              <a:rPr lang="en-US" sz="1800" b="0" dirty="0">
-                <a:solidFill>
-                  <a:srgbClr val="000000"/>
-                </a:solidFill>
-                <a:effectLst/>
-                <a:latin typeface="Cascadia Mono" panose="020B0609020000020004" pitchFamily="49" charset="0"/>
-              </a:rPr>
-              <a:t> </a:t>
-            </a:r>
-            <a:r>
-              <a:rPr lang="en-US" sz="1800" b="0" dirty="0">
-                <a:solidFill>
-                  <a:srgbClr val="795E26"/>
-                </a:solidFill>
-                <a:effectLst/>
-                <a:latin typeface="Cascadia Mono" panose="020B0609020000020004" pitchFamily="49" charset="0"/>
-              </a:rPr>
-              <a:t>floor</a:t>
-            </a:r>
-            <a:r>
-              <a:rPr lang="en-US" sz="1800" b="0" dirty="0">
-                <a:solidFill>
-                  <a:srgbClr val="000000"/>
-                </a:solidFill>
-                <a:effectLst/>
-                <a:latin typeface="Cascadia Mono" panose="020B0609020000020004" pitchFamily="49" charset="0"/>
-              </a:rPr>
-              <a:t>(</a:t>
-            </a:r>
-            <a:r>
-              <a:rPr lang="en-US" sz="1800" b="0" dirty="0">
-                <a:solidFill>
-                  <a:srgbClr val="001080"/>
-                </a:solidFill>
-                <a:effectLst/>
-                <a:latin typeface="Cascadia Mono" panose="020B0609020000020004" pitchFamily="49" charset="0"/>
-              </a:rPr>
-              <a:t>A</a:t>
-            </a:r>
-            <a:r>
-              <a:rPr lang="en-US" sz="1800" b="0" dirty="0">
-                <a:solidFill>
-                  <a:srgbClr val="000000"/>
-                </a:solidFill>
-                <a:effectLst/>
-                <a:latin typeface="Cascadia Mono" panose="020B0609020000020004" pitchFamily="49" charset="0"/>
-              </a:rPr>
-              <a:t>*</a:t>
-            </a:r>
-            <a:r>
-              <a:rPr lang="en-US" sz="1800" b="0" dirty="0">
-                <a:solidFill>
-                  <a:srgbClr val="001080"/>
-                </a:solidFill>
-                <a:effectLst/>
-                <a:latin typeface="Cascadia Mono" panose="020B0609020000020004" pitchFamily="49" charset="0"/>
-              </a:rPr>
-              <a:t>key</a:t>
-            </a:r>
-            <a:r>
-              <a:rPr lang="en-US" sz="1800" b="0" dirty="0">
-                <a:solidFill>
-                  <a:srgbClr val="000000"/>
-                </a:solidFill>
-                <a:effectLst/>
-                <a:latin typeface="Cascadia Mono" panose="020B0609020000020004" pitchFamily="49" charset="0"/>
-              </a:rPr>
-              <a:t>);</a:t>
-            </a:r>
-          </a:p>
-          <a:p>
-            <a:pPr marL="0" indent="0">
-              <a:buNone/>
-            </a:pPr>
-            <a:r>
-              <a:rPr lang="en-US" sz="1800" b="0" dirty="0">
-                <a:solidFill>
-                  <a:srgbClr val="000000"/>
-                </a:solidFill>
-                <a:effectLst/>
-                <a:latin typeface="Cascadia Mono" panose="020B0609020000020004" pitchFamily="49" charset="0"/>
-              </a:rPr>
-              <a:t>    </a:t>
-            </a:r>
-            <a:r>
-              <a:rPr lang="en-US" sz="1800" b="0" dirty="0">
-                <a:solidFill>
-                  <a:srgbClr val="AF00DB"/>
-                </a:solidFill>
-                <a:effectLst/>
-                <a:latin typeface="Cascadia Mono" panose="020B0609020000020004" pitchFamily="49" charset="0"/>
-              </a:rPr>
-              <a:t>return</a:t>
-            </a:r>
-            <a:r>
-              <a:rPr lang="en-US" sz="1800" dirty="0">
-                <a:solidFill>
-                  <a:srgbClr val="000000"/>
-                </a:solidFill>
-                <a:latin typeface="Cascadia Mono" panose="020B0609020000020004" pitchFamily="49" charset="0"/>
-              </a:rPr>
-              <a:t> </a:t>
-            </a:r>
-            <a:r>
-              <a:rPr lang="en-US" sz="1800" b="0" dirty="0">
-                <a:solidFill>
-                  <a:srgbClr val="795E26"/>
-                </a:solidFill>
-                <a:effectLst/>
-                <a:latin typeface="Cascadia Mono" panose="020B0609020000020004" pitchFamily="49" charset="0"/>
-              </a:rPr>
-              <a:t>floor</a:t>
-            </a:r>
-            <a:r>
-              <a:rPr lang="en-US" sz="1800" b="0" dirty="0">
-                <a:solidFill>
-                  <a:srgbClr val="000000"/>
-                </a:solidFill>
-                <a:effectLst/>
-                <a:latin typeface="Cascadia Mono" panose="020B0609020000020004" pitchFamily="49" charset="0"/>
-              </a:rPr>
-              <a:t>(</a:t>
-            </a:r>
-            <a:r>
-              <a:rPr lang="en-US" sz="1800" b="0" dirty="0">
-                <a:solidFill>
-                  <a:srgbClr val="001080"/>
-                </a:solidFill>
-                <a:effectLst/>
-                <a:latin typeface="Cascadia Mono" panose="020B0609020000020004" pitchFamily="49" charset="0"/>
-              </a:rPr>
-              <a:t>m</a:t>
-            </a:r>
-            <a:r>
-              <a:rPr lang="en-US" sz="1800" b="0" dirty="0">
-                <a:solidFill>
-                  <a:srgbClr val="000000"/>
-                </a:solidFill>
-                <a:effectLst/>
-                <a:latin typeface="Cascadia Mono" panose="020B0609020000020004" pitchFamily="49" charset="0"/>
-              </a:rPr>
-              <a:t>*</a:t>
-            </a:r>
-            <a:r>
-              <a:rPr lang="en-US" sz="1800" b="0" dirty="0">
-                <a:solidFill>
-                  <a:srgbClr val="001080"/>
-                </a:solidFill>
-                <a:effectLst/>
-                <a:latin typeface="Cascadia Mono" panose="020B0609020000020004" pitchFamily="49" charset="0"/>
-              </a:rPr>
-              <a:t>extracted</a:t>
-            </a:r>
-            <a:r>
-              <a:rPr lang="en-US" sz="1800" b="0" dirty="0">
-                <a:solidFill>
-                  <a:srgbClr val="000000"/>
-                </a:solidFill>
-                <a:effectLst/>
-                <a:latin typeface="Cascadia Mono" panose="020B0609020000020004" pitchFamily="49" charset="0"/>
-              </a:rPr>
-              <a:t>);</a:t>
-            </a:r>
-          </a:p>
-          <a:p>
-            <a:pPr marL="0" indent="0">
-              <a:buNone/>
-            </a:pPr>
-            <a:r>
-              <a:rPr lang="en-US" sz="1800" b="0" dirty="0">
-                <a:solidFill>
-                  <a:srgbClr val="000000"/>
-                </a:solidFill>
-                <a:effectLst/>
-                <a:latin typeface="Cascadia Mono" panose="020B0609020000020004" pitchFamily="49" charset="0"/>
-              </a:rPr>
-              <a:t>}</a:t>
+                <a:latin typeface="Cascadia Mono" panose="020B0609020000020004" pitchFamily="49" charset="0"/>
+              </a:rPr>
+              <a:t>   m * extracted.</a:t>
             </a:r>
           </a:p>
         </p:txBody>
@@ -27675,119 +26991,37 @@
               <a:buNone/>
             </a:pPr>
             <a:r>
-              <a:rPr lang="en-IN" sz="1800" b="0" dirty="0">
+              <a:rPr lang="en-IN" sz="1800" b="0" dirty="0" err="1">
                 <a:solidFill>
                   <a:srgbClr val="0000FF"/>
                 </a:solidFill>
                 <a:effectLst/>
                 <a:latin typeface="Cascadia Mono" panose="020B0609020000020004" pitchFamily="49" charset="0"/>
               </a:rPr>
-              <a:t>int</a:t>
-            </a:r>
-            <a:r>
-              <a:rPr lang="en-IN" sz="1800" b="0" dirty="0">
-                <a:solidFill>
-                  <a:srgbClr val="000000"/>
-                </a:solidFill>
-                <a:effectLst/>
-                <a:latin typeface="Cascadia Mono" panose="020B0609020000020004" pitchFamily="49" charset="0"/>
-              </a:rPr>
-              <a:t> </a:t>
-            </a:r>
-            <a:r>
-              <a:rPr lang="en-IN" sz="1800" b="0" dirty="0" err="1">
-                <a:solidFill>
-                  <a:srgbClr val="795E26"/>
-                </a:solidFill>
-                <a:effectLst/>
-                <a:latin typeface="Cascadia Mono" panose="020B0609020000020004" pitchFamily="49" charset="0"/>
-              </a:rPr>
-              <a:t>midsquare_method</a:t>
-            </a:r>
-            <a:r>
-              <a:rPr lang="en-IN" sz="1800" b="0" dirty="0">
-                <a:solidFill>
-                  <a:srgbClr val="000000"/>
-                </a:solidFill>
-                <a:effectLst/>
-                <a:latin typeface="Cascadia Mono" panose="020B0609020000020004" pitchFamily="49" charset="0"/>
-              </a:rPr>
-              <a:t>(</a:t>
-            </a:r>
-            <a:r>
-              <a:rPr lang="en-IN" sz="1800" b="0" dirty="0">
+              <a:t>mid_square_method</a:t>
+            </a:r>
+            <a:r>
+              <a:rPr lang="en-IN" sz="1800" dirty="0">
                 <a:solidFill>
                   <a:srgbClr val="0000FF"/>
                 </a:solidFill>
-                <a:effectLst/>
-                <a:latin typeface="Cascadia Mono" panose="020B0609020000020004" pitchFamily="49" charset="0"/>
-              </a:rPr>
-              <a:t>int</a:t>
-            </a:r>
-            <a:r>
-              <a:rPr lang="en-IN" sz="1800" b="0" dirty="0">
-                <a:solidFill>
-                  <a:srgbClr val="000000"/>
-                </a:solidFill>
-                <a:effectLst/>
-                <a:latin typeface="Cascadia Mono" panose="020B0609020000020004" pitchFamily="49" charset="0"/>
-              </a:rPr>
-              <a:t> </a:t>
-            </a:r>
-            <a:r>
-              <a:rPr lang="en-IN" sz="1800" b="0" dirty="0">
-                <a:solidFill>
-                  <a:srgbClr val="001080"/>
-                </a:solidFill>
-                <a:effectLst/>
-                <a:latin typeface="Cascadia Mono" panose="020B0609020000020004" pitchFamily="49" charset="0"/>
-              </a:rPr>
-              <a:t>key</a:t>
-            </a:r>
-            <a:r>
-              <a:rPr lang="en-IN" sz="1800" b="0" dirty="0">
-                <a:solidFill>
-                  <a:srgbClr val="000000"/>
-                </a:solidFill>
-                <a:effectLst/>
-                <a:latin typeface="Cascadia Mono" panose="020B0609020000020004" pitchFamily="49" charset="0"/>
-              </a:rPr>
-              <a:t>) {</a:t>
-            </a:r>
-          </a:p>
-          <a:p>
-            <a:pPr marL="0" indent="0">
-              <a:buNone/>
-            </a:pPr>
-            <a:r>
-              <a:rPr lang="en-IN" sz="1800" b="0" dirty="0">
-                <a:solidFill>
-                  <a:srgbClr val="000000"/>
-                </a:solidFill>
-                <a:effectLst/>
-                <a:latin typeface="Cascadia Mono" panose="020B0609020000020004" pitchFamily="49" charset="0"/>
-              </a:rPr>
-              <a:t>    </a:t>
-            </a:r>
-            <a:r>
-              <a:rPr lang="en-IN" sz="1800" b="0" dirty="0" err="1">
+                <a:latin typeface="Cascadia Mono" panose="020B0609020000020004" pitchFamily="49" charset="0"/>
+              </a:rPr>
+              <a:t>: key</a:t>
+            </a:r>
+          </a:p>
+          <a:p>
+            <a:pPr marL="0" indent="0">
+              <a:buNone/>
+            </a:pPr>
+            <a:r>
+              <a:rPr lang="en-IN" sz="1800" dirty="0">
                 <a:solidFill>
                   <a:srgbClr val="0000FF"/>
                 </a:solidFill>
-                <a:effectLst/>
-                <a:latin typeface="Cascadia Mono" panose="020B0609020000020004" pitchFamily="49" charset="0"/>
-              </a:rPr>
-              <a:t>const</a:t>
-            </a:r>
-            <a:r>
-              <a:rPr lang="en-IN" sz="1800" b="0" dirty="0">
-                <a:solidFill>
-                  <a:srgbClr val="000000"/>
-                </a:solidFill>
-                <a:effectLst/>
-                <a:latin typeface="Cascadia Mono" panose="020B0609020000020004" pitchFamily="49" charset="0"/>
-              </a:rPr>
-              <a:t> </a:t>
+                <a:latin typeface="Cascadia Mono" panose="020B0609020000020004" pitchFamily="49" charset="0"/>
+              </a:rPr>
+              <a:t>1. </a:t>
             </a:r>
             <a:r>
               <a:rPr lang="en-IN" sz="1800" b="0" dirty="0">
@@ -27797,73 +27031,13 @@
                 <a:effectLst/>
                 <a:latin typeface="Cascadia Mono" panose="020B0609020000020004" pitchFamily="49" charset="0"/>
               </a:rPr>
-              <a:t>int</a:t>
-            </a:r>
-            <a:r>
-              <a:rPr lang="en-IN" sz="1800" b="0" dirty="0">
-                <a:solidFill>
-                  <a:srgbClr val="000000"/>
-                </a:solidFill>
-                <a:effectLst/>
-                <a:latin typeface="Cascadia Mono" panose="020B0609020000020004" pitchFamily="49" charset="0"/>
-              </a:rPr>
-              <a:t> </a:t>
-            </a:r>
-            <a:r>
-              <a:rPr lang="en-IN" sz="1800" b="0" dirty="0">
-                <a:solidFill>
-                  <a:srgbClr val="001080"/>
-                </a:solidFill>
-                <a:effectLst/>
-                <a:latin typeface="Cascadia Mono" panose="020B0609020000020004" pitchFamily="49" charset="0"/>
-              </a:rPr>
-              <a:t>r</a:t>
-            </a:r>
-            <a:r>
-              <a:rPr lang="en-IN" sz="1800" b="0" dirty="0">
-                <a:solidFill>
-                  <a:srgbClr val="000000"/>
-                </a:solidFill>
-                <a:effectLst/>
-                <a:latin typeface="Cascadia Mono" panose="020B0609020000020004" pitchFamily="49" charset="0"/>
-              </a:rPr>
-              <a:t> = </a:t>
-            </a:r>
-            <a:r>
-              <a:rPr lang="en-IN" sz="1800" b="0" dirty="0">
-                <a:solidFill>
-                  <a:srgbClr val="098658"/>
-                </a:solidFill>
-                <a:effectLst/>
-                <a:latin typeface="Cascadia Mono" panose="020B0609020000020004" pitchFamily="49" charset="0"/>
-              </a:rPr>
-              <a:t>3</a:t>
-            </a:r>
-            <a:r>
-              <a:rPr lang="en-IN" sz="1800" b="0" dirty="0">
-                <a:solidFill>
-                  <a:srgbClr val="000000"/>
-                </a:solidFill>
-                <a:effectLst/>
-                <a:latin typeface="Cascadia Mono" panose="020B0609020000020004" pitchFamily="49" charset="0"/>
-              </a:rPr>
-              <a:t>;</a:t>
-            </a:r>
-          </a:p>
-          <a:p>
-            <a:pPr marL="0" indent="0">
-              <a:buNone/>
-            </a:pPr>
-            <a:r>
-              <a:rPr lang="en-IN" sz="1800" b="0" dirty="0">
-                <a:solidFill>
-                  <a:srgbClr val="000000"/>
-                </a:solidFill>
-                <a:effectLst/>
-                <a:latin typeface="Cascadia Mono" panose="020B0609020000020004" pitchFamily="49" charset="0"/>
-              </a:rPr>
-              <a:t>    </a:t>
-            </a:r>
+              <a:t>Find the square of key.</a:t>
+            </a:r>
+          </a:p>
+          <a:p>
+            <a:pPr marL="0" indent="0">
+              <a:buNone/>
+            </a:pPr>
             <a:r>
               <a:rPr lang="en-IN" sz="1800" b="0" dirty="0">
                 <a:solidFill>
@@ -27872,541 +27046,54 @@
                 <a:effectLst/>
                 <a:latin typeface="Cascadia Mono" panose="020B0609020000020004" pitchFamily="49" charset="0"/>
               </a:rPr>
-              <a:t>int</a:t>
-            </a:r>
-            <a:r>
-              <a:rPr lang="en-IN" sz="1800" b="0" dirty="0">
-                <a:solidFill>
-                  <a:srgbClr val="000000"/>
-                </a:solidFill>
-                <a:effectLst/>
-                <a:latin typeface="Cascadia Mono" panose="020B0609020000020004" pitchFamily="49" charset="0"/>
-              </a:rPr>
-              <a:t> </a:t>
-            </a:r>
-            <a:r>
-              <a:rPr lang="en-IN" sz="1800" b="0" dirty="0" err="1">
-                <a:solidFill>
-                  <a:srgbClr val="001080"/>
-                </a:solidFill>
-                <a:effectLst/>
-                <a:latin typeface="Cascadia Mono" panose="020B0609020000020004" pitchFamily="49" charset="0"/>
-              </a:rPr>
-              <a:t>key_sq</a:t>
-            </a:r>
-            <a:r>
-              <a:rPr lang="en-IN" sz="1800" b="0" dirty="0">
-                <a:solidFill>
-                  <a:srgbClr val="000000"/>
-                </a:solidFill>
-                <a:effectLst/>
-                <a:latin typeface="Cascadia Mono" panose="020B0609020000020004" pitchFamily="49" charset="0"/>
-              </a:rPr>
-              <a:t> = </a:t>
-            </a:r>
-            <a:r>
-              <a:rPr lang="en-IN" sz="1800" b="0" dirty="0">
-                <a:solidFill>
-                  <a:srgbClr val="001080"/>
-                </a:solidFill>
-                <a:effectLst/>
-                <a:latin typeface="Cascadia Mono" panose="020B0609020000020004" pitchFamily="49" charset="0"/>
-              </a:rPr>
-              <a:t>key</a:t>
-            </a:r>
-            <a:r>
-              <a:rPr lang="en-IN" sz="1800" b="0" dirty="0">
-                <a:solidFill>
-                  <a:srgbClr val="000000"/>
-                </a:solidFill>
-                <a:effectLst/>
-                <a:latin typeface="Cascadia Mono" panose="020B0609020000020004" pitchFamily="49" charset="0"/>
-              </a:rPr>
-              <a:t> * </a:t>
-            </a:r>
-            <a:r>
-              <a:rPr lang="en-IN" sz="1800" b="0" dirty="0">
-                <a:solidFill>
-                  <a:srgbClr val="001080"/>
-                </a:solidFill>
-                <a:effectLst/>
-                <a:latin typeface="Cascadia Mono" panose="020B0609020000020004" pitchFamily="49" charset="0"/>
-              </a:rPr>
-              <a:t>key</a:t>
-            </a:r>
-            <a:r>
-              <a:rPr lang="en-IN" sz="1800" b="0" dirty="0">
-                <a:solidFill>
-                  <a:srgbClr val="000000"/>
-                </a:solidFill>
-                <a:effectLst/>
-                <a:latin typeface="Cascadia Mono" panose="020B0609020000020004" pitchFamily="49" charset="0"/>
-              </a:rPr>
-              <a:t>;</a:t>
-            </a:r>
-          </a:p>
-          <a:p>
-            <a:pPr marL="0" indent="0">
-              <a:buNone/>
-            </a:pPr>
-            <a:r>
-              <a:rPr lang="en-IN" sz="1800" b="0" dirty="0">
-                <a:solidFill>
-                  <a:srgbClr val="000000"/>
-                </a:solidFill>
-                <a:effectLst/>
-                <a:latin typeface="Cascadia Mono" panose="020B0609020000020004" pitchFamily="49" charset="0"/>
-              </a:rPr>
-              <a:t>    </a:t>
-            </a:r>
-            <a:r>
-              <a:rPr lang="en-IN" sz="1800" b="0" dirty="0">
+              <a:t>2. Slice the mid</a:t>
+            </a:r>
+            <a:r>
+              <a:rPr lang="en-IN" sz="1800" dirty="0">
                 <a:solidFill>
                   <a:srgbClr val="0000FF"/>
                 </a:solidFill>
-                <a:effectLst/>
-                <a:latin typeface="Cascadia Mono" panose="020B0609020000020004" pitchFamily="49" charset="0"/>
-              </a:rPr>
-              <a:t>int</a:t>
-            </a:r>
-            <a:r>
-              <a:rPr lang="en-IN" sz="1800" b="0" dirty="0">
-                <a:solidFill>
-                  <a:srgbClr val="000000"/>
-                </a:solidFill>
-                <a:effectLst/>
-                <a:latin typeface="Cascadia Mono" panose="020B0609020000020004" pitchFamily="49" charset="0"/>
-              </a:rPr>
-              <a:t> </a:t>
-            </a:r>
-            <a:r>
-              <a:rPr lang="en-IN" sz="1800" b="0" dirty="0">
-                <a:solidFill>
-                  <a:srgbClr val="001080"/>
-                </a:solidFill>
-                <a:effectLst/>
-                <a:latin typeface="Cascadia Mono" panose="020B0609020000020004" pitchFamily="49" charset="0"/>
-              </a:rPr>
-              <a:t>n</a:t>
-            </a:r>
-            <a:r>
-              <a:rPr lang="en-IN" sz="1800" b="0" dirty="0">
-                <a:solidFill>
-                  <a:srgbClr val="000000"/>
-                </a:solidFill>
-                <a:effectLst/>
-                <a:latin typeface="Cascadia Mono" panose="020B0609020000020004" pitchFamily="49" charset="0"/>
-              </a:rPr>
-              <a:t> = </a:t>
-            </a:r>
-            <a:r>
-              <a:rPr lang="en-IN" sz="1800" b="0" dirty="0" err="1">
-                <a:solidFill>
-                  <a:srgbClr val="795E26"/>
-                </a:solidFill>
-                <a:effectLst/>
-                <a:latin typeface="Cascadia Mono" panose="020B0609020000020004" pitchFamily="49" charset="0"/>
-              </a:rPr>
-              <a:t>count_digits</a:t>
-            </a:r>
-            <a:r>
-              <a:rPr lang="en-IN" sz="1800" b="0" dirty="0">
-                <a:solidFill>
-                  <a:srgbClr val="000000"/>
-                </a:solidFill>
-                <a:effectLst/>
-                <a:latin typeface="Cascadia Mono" panose="020B0609020000020004" pitchFamily="49" charset="0"/>
-              </a:rPr>
-              <a:t>(</a:t>
-            </a:r>
-            <a:r>
-              <a:rPr lang="en-IN" sz="1800" b="0" dirty="0" err="1">
-                <a:solidFill>
-                  <a:srgbClr val="001080"/>
-                </a:solidFill>
-                <a:effectLst/>
-                <a:latin typeface="Cascadia Mono" panose="020B0609020000020004" pitchFamily="49" charset="0"/>
-              </a:rPr>
-              <a:t>key_sq</a:t>
-            </a:r>
-            <a:r>
-              <a:rPr lang="en-IN" sz="1800" b="0" dirty="0">
-                <a:solidFill>
-                  <a:srgbClr val="000000"/>
-                </a:solidFill>
-                <a:effectLst/>
-                <a:latin typeface="Cascadia Mono" panose="020B0609020000020004" pitchFamily="49" charset="0"/>
-              </a:rPr>
-              <a:t>);</a:t>
-            </a:r>
-          </a:p>
-          <a:p>
-            <a:pPr marL="0" indent="0">
-              <a:buNone/>
-            </a:pPr>
-            <a:r>
-              <a:rPr lang="en-IN" sz="1800" b="0" dirty="0">
-                <a:solidFill>
-                  <a:srgbClr val="000000"/>
-                </a:solidFill>
-                <a:effectLst/>
-                <a:latin typeface="Cascadia Mono" panose="020B0609020000020004" pitchFamily="49" charset="0"/>
-              </a:rPr>
-              <a:t>    </a:t>
-            </a:r>
-            <a:r>
-              <a:rPr lang="en-IN" sz="1800" b="0" dirty="0">
+                <a:latin typeface="Cascadia Mono" panose="020B0609020000020004" pitchFamily="49" charset="0"/>
+              </a:rPr>
+              <a:t>dle r digits from the</a:t>
+            </a:r>
+          </a:p>
+          <a:p>
+            <a:pPr marL="0" indent="0">
+              <a:buNone/>
+            </a:pPr>
+            <a:r>
+              <a:rPr lang="en-IN" sz="1800" dirty="0">
                 <a:solidFill>
                   <a:srgbClr val="0000FF"/>
                 </a:solidFill>
-                <a:effectLst/>
-                <a:latin typeface="Cascadia Mono" panose="020B0609020000020004" pitchFamily="49" charset="0"/>
-              </a:rPr>
-              <a:t>int</a:t>
-            </a:r>
-            <a:r>
-              <a:rPr lang="en-IN" sz="1800" b="0" dirty="0">
-                <a:solidFill>
-                  <a:srgbClr val="000000"/>
-                </a:solidFill>
-                <a:effectLst/>
-                <a:latin typeface="Cascadia Mono" panose="020B0609020000020004" pitchFamily="49" charset="0"/>
-              </a:rPr>
-              <a:t> </a:t>
-            </a:r>
-            <a:r>
-              <a:rPr lang="en-IN" sz="1800" b="0" dirty="0">
-                <a:solidFill>
-                  <a:srgbClr val="001080"/>
-                </a:solidFill>
-                <a:effectLst/>
-                <a:latin typeface="Cascadia Mono" panose="020B0609020000020004" pitchFamily="49" charset="0"/>
-              </a:rPr>
-              <a:t>start</a:t>
-            </a:r>
-            <a:r>
-              <a:rPr lang="en-IN" sz="1800" b="0" dirty="0">
-                <a:solidFill>
-                  <a:srgbClr val="000000"/>
-                </a:solidFill>
-                <a:effectLst/>
-                <a:latin typeface="Cascadia Mono" panose="020B0609020000020004" pitchFamily="49" charset="0"/>
-              </a:rPr>
-              <a:t> = (</a:t>
-            </a:r>
-            <a:r>
-              <a:rPr lang="en-IN" sz="1800" b="0" dirty="0">
-                <a:solidFill>
-                  <a:srgbClr val="001080"/>
-                </a:solidFill>
-                <a:effectLst/>
-                <a:latin typeface="Cascadia Mono" panose="020B0609020000020004" pitchFamily="49" charset="0"/>
-              </a:rPr>
-              <a:t>n-r</a:t>
-            </a:r>
-            <a:r>
-              <a:rPr lang="en-IN" sz="1800" b="0" dirty="0">
-                <a:solidFill>
-                  <a:srgbClr val="000000"/>
-                </a:solidFill>
-                <a:effectLst/>
-                <a:latin typeface="Cascadia Mono" panose="020B0609020000020004" pitchFamily="49" charset="0"/>
-              </a:rPr>
-              <a:t>) / </a:t>
-            </a:r>
-            <a:r>
-              <a:rPr lang="en-IN" sz="1800" b="0" dirty="0">
-                <a:solidFill>
-                  <a:srgbClr val="098658"/>
-                </a:solidFill>
-                <a:effectLst/>
-                <a:latin typeface="Cascadia Mono" panose="020B0609020000020004" pitchFamily="49" charset="0"/>
-              </a:rPr>
-              <a:t>2</a:t>
-            </a:r>
-            <a:r>
-              <a:rPr lang="en-IN" sz="1800" b="0" dirty="0">
-                <a:solidFill>
-                  <a:srgbClr val="000000"/>
-                </a:solidFill>
-                <a:effectLst/>
-                <a:latin typeface="Cascadia Mono" panose="020B0609020000020004" pitchFamily="49" charset="0"/>
-              </a:rPr>
-              <a:t>;</a:t>
-            </a:r>
-          </a:p>
-          <a:p>
-            <a:pPr marL="0" indent="0">
-              <a:buNone/>
-            </a:pPr>
-            <a:r>
-              <a:rPr lang="en-IN" sz="1800" b="0" dirty="0">
-                <a:solidFill>
-                  <a:srgbClr val="000000"/>
-                </a:solidFill>
-                <a:effectLst/>
-                <a:latin typeface="Cascadia Mono" panose="020B0609020000020004" pitchFamily="49" charset="0"/>
-              </a:rPr>
-              <a:t>    </a:t>
-            </a:r>
-            <a:r>
-              <a:rPr lang="en-IN" sz="1800" b="0" dirty="0" err="1">
-                <a:solidFill>
-                  <a:srgbClr val="001080"/>
-                </a:solidFill>
-                <a:effectLst/>
-                <a:latin typeface="Cascadia Mono" panose="020B0609020000020004" pitchFamily="49" charset="0"/>
-              </a:rPr>
-              <a:t>key_sq</a:t>
-            </a:r>
-            <a:r>
-              <a:rPr lang="en-IN" sz="1800" b="0" dirty="0">
-                <a:solidFill>
-                  <a:srgbClr val="000000"/>
-                </a:solidFill>
-                <a:effectLst/>
-                <a:latin typeface="Cascadia Mono" panose="020B0609020000020004" pitchFamily="49" charset="0"/>
-              </a:rPr>
-              <a:t> /= </a:t>
-            </a:r>
-            <a:r>
-              <a:rPr lang="en-IN" sz="1800" b="0" dirty="0" err="1">
-                <a:solidFill>
-                  <a:srgbClr val="795E26"/>
-                </a:solidFill>
-                <a:effectLst/>
-                <a:latin typeface="Cascadia Mono" panose="020B0609020000020004" pitchFamily="49" charset="0"/>
-              </a:rPr>
-              <a:t>ten_raised</a:t>
-            </a:r>
-            <a:r>
-              <a:rPr lang="en-IN" sz="1800" b="0" dirty="0">
-                <a:solidFill>
-                  <a:srgbClr val="000000"/>
-                </a:solidFill>
-                <a:effectLst/>
-                <a:latin typeface="Cascadia Mono" panose="020B0609020000020004" pitchFamily="49" charset="0"/>
-              </a:rPr>
-              <a:t>(</a:t>
-            </a:r>
-            <a:r>
-              <a:rPr lang="en-IN" sz="1800" b="0" dirty="0">
-                <a:solidFill>
-                  <a:srgbClr val="001080"/>
-                </a:solidFill>
-                <a:effectLst/>
-                <a:latin typeface="Cascadia Mono" panose="020B0609020000020004" pitchFamily="49" charset="0"/>
-              </a:rPr>
-              <a:t>start</a:t>
-            </a:r>
-            <a:r>
-              <a:rPr lang="en-IN" sz="1800" b="0" dirty="0">
-                <a:solidFill>
-                  <a:srgbClr val="000000"/>
-                </a:solidFill>
-                <a:effectLst/>
-                <a:latin typeface="Cascadia Mono" panose="020B0609020000020004" pitchFamily="49" charset="0"/>
-              </a:rPr>
-              <a:t>);</a:t>
-            </a:r>
-          </a:p>
-          <a:p>
-            <a:pPr marL="0" indent="0">
-              <a:buNone/>
-            </a:pPr>
-            <a:r>
-              <a:rPr lang="en-IN" sz="1800" b="0" dirty="0">
-                <a:solidFill>
-                  <a:srgbClr val="000000"/>
-                </a:solidFill>
-                <a:effectLst/>
-                <a:latin typeface="Cascadia Mono" panose="020B0609020000020004" pitchFamily="49" charset="0"/>
-              </a:rPr>
-              <a:t>    </a:t>
-            </a:r>
-            <a:r>
-              <a:rPr lang="en-IN" sz="1800" b="0" dirty="0">
-                <a:solidFill>
-                  <a:srgbClr val="AF00DB"/>
-                </a:solidFill>
-                <a:effectLst/>
-                <a:latin typeface="Cascadia Mono" panose="020B0609020000020004" pitchFamily="49" charset="0"/>
-              </a:rPr>
-              <a:t>return</a:t>
-            </a:r>
-            <a:r>
-              <a:rPr lang="en-IN" sz="1800" b="0" dirty="0">
-                <a:solidFill>
-                  <a:srgbClr val="000000"/>
-                </a:solidFill>
-                <a:effectLst/>
-                <a:latin typeface="Cascadia Mono" panose="020B0609020000020004" pitchFamily="49" charset="0"/>
-              </a:rPr>
-              <a:t> </a:t>
-            </a:r>
-            <a:r>
-              <a:rPr lang="en-IN" sz="1800" b="0" dirty="0" err="1">
-                <a:solidFill>
-                  <a:srgbClr val="001080"/>
-                </a:solidFill>
-                <a:effectLst/>
-                <a:latin typeface="Cascadia Mono" panose="020B0609020000020004" pitchFamily="49" charset="0"/>
-              </a:rPr>
-              <a:t>key_sq</a:t>
-            </a:r>
-            <a:r>
-              <a:rPr lang="en-IN" sz="1800" b="0" dirty="0">
-                <a:solidFill>
-                  <a:srgbClr val="000000"/>
-                </a:solidFill>
-                <a:effectLst/>
-                <a:latin typeface="Cascadia Mono" panose="020B0609020000020004" pitchFamily="49" charset="0"/>
-              </a:rPr>
-              <a:t> – </a:t>
-            </a:r>
-          </a:p>
-          <a:p>
-            <a:pPr marL="0" indent="0">
-              <a:buNone/>
-            </a:pPr>
-            <a:r>
-              <a:rPr lang="en-IN" sz="1800" b="0" dirty="0">
-                <a:solidFill>
-                  <a:srgbClr val="000000"/>
-                </a:solidFill>
-                <a:effectLst/>
-                <a:latin typeface="Cascadia Mono" panose="020B0609020000020004" pitchFamily="49" charset="0"/>
-              </a:rPr>
-              <a:t>(</a:t>
-            </a:r>
-            <a:r>
-              <a:rPr lang="en-IN" sz="1800" b="0" dirty="0" err="1">
-                <a:solidFill>
-                  <a:srgbClr val="001080"/>
-                </a:solidFill>
-                <a:effectLst/>
-                <a:latin typeface="Cascadia Mono" panose="020B0609020000020004" pitchFamily="49" charset="0"/>
-              </a:rPr>
-              <a:t>key_sq</a:t>
-            </a:r>
-            <a:r>
-              <a:rPr lang="en-IN" sz="1800" b="0" dirty="0">
-                <a:solidFill>
-                  <a:srgbClr val="000000"/>
-                </a:solidFill>
-                <a:effectLst/>
-                <a:latin typeface="Cascadia Mono" panose="020B0609020000020004" pitchFamily="49" charset="0"/>
-              </a:rPr>
-              <a:t>/</a:t>
-            </a:r>
-            <a:r>
-              <a:rPr lang="en-IN" sz="1800" b="0" dirty="0" err="1">
-                <a:solidFill>
-                  <a:srgbClr val="795E26"/>
-                </a:solidFill>
-                <a:effectLst/>
-                <a:latin typeface="Cascadia Mono" panose="020B0609020000020004" pitchFamily="49" charset="0"/>
-              </a:rPr>
-              <a:t>ten_raised</a:t>
-            </a:r>
-            <a:r>
-              <a:rPr lang="en-IN" sz="1800" b="0" dirty="0">
-                <a:solidFill>
-                  <a:srgbClr val="000000"/>
-                </a:solidFill>
-                <a:effectLst/>
-                <a:latin typeface="Cascadia Mono" panose="020B0609020000020004" pitchFamily="49" charset="0"/>
-              </a:rPr>
-              <a:t>(</a:t>
-            </a:r>
-            <a:r>
-              <a:rPr lang="en-IN" sz="1800" b="0" dirty="0">
-                <a:solidFill>
-                  <a:srgbClr val="001080"/>
-                </a:solidFill>
-                <a:effectLst/>
-                <a:latin typeface="Cascadia Mono" panose="020B0609020000020004" pitchFamily="49" charset="0"/>
-              </a:rPr>
-              <a:t>r</a:t>
-            </a:r>
-            <a:r>
-              <a:rPr lang="en-IN" sz="1800" b="0" dirty="0">
-                <a:solidFill>
-                  <a:srgbClr val="000000"/>
-                </a:solidFill>
-                <a:effectLst/>
-                <a:latin typeface="Cascadia Mono" panose="020B0609020000020004" pitchFamily="49" charset="0"/>
-              </a:rPr>
-              <a:t>)) * </a:t>
-            </a:r>
-          </a:p>
-          <a:p>
-            <a:pPr marL="0" indent="0">
-              <a:buNone/>
-            </a:pPr>
-            <a:r>
-              <a:rPr lang="en-IN" sz="1800" dirty="0" err="1">
-                <a:solidFill>
-                  <a:srgbClr val="795E26"/>
-                </a:solidFill>
-                <a:latin typeface="Cascadia Mono" panose="020B0609020000020004" pitchFamily="49" charset="0"/>
-              </a:rPr>
-              <a:t>t</a:t>
-            </a:r>
-            <a:r>
-              <a:rPr lang="en-IN" sz="1800" b="0" dirty="0" err="1">
-                <a:solidFill>
-                  <a:srgbClr val="795E26"/>
-                </a:solidFill>
-                <a:effectLst/>
-                <a:latin typeface="Cascadia Mono" panose="020B0609020000020004" pitchFamily="49" charset="0"/>
-              </a:rPr>
-              <a:t>en_raised</a:t>
-            </a:r>
-            <a:r>
-              <a:rPr lang="en-IN" sz="1800" b="0" dirty="0">
-                <a:solidFill>
-                  <a:srgbClr val="000000"/>
-                </a:solidFill>
-                <a:effectLst/>
-                <a:latin typeface="Cascadia Mono" panose="020B0609020000020004" pitchFamily="49" charset="0"/>
-              </a:rPr>
-              <a:t>(</a:t>
-            </a:r>
-            <a:r>
-              <a:rPr lang="en-IN" sz="1800" b="0" dirty="0">
-                <a:solidFill>
-                  <a:srgbClr val="001080"/>
-                </a:solidFill>
-                <a:effectLst/>
-                <a:latin typeface="Cascadia Mono" panose="020B0609020000020004" pitchFamily="49" charset="0"/>
-              </a:rPr>
-              <a:t>r</a:t>
-            </a:r>
-            <a:r>
-              <a:rPr lang="en-IN" sz="1800" b="0" dirty="0">
-                <a:solidFill>
-                  <a:srgbClr val="000000"/>
-                </a:solidFill>
-                <a:effectLst/>
-                <a:latin typeface="Cascadia Mono" panose="020B0609020000020004" pitchFamily="49" charset="0"/>
-              </a:rPr>
-              <a:t>);</a:t>
-            </a:r>
-          </a:p>
-          <a:p>
-            <a:pPr marL="0" indent="0">
-              <a:buNone/>
-            </a:pPr>
-            <a:r>
-              <a:rPr lang="en-IN" sz="1800" b="0" dirty="0">
-                <a:solidFill>
-                  <a:srgbClr val="000000"/>
-                </a:solidFill>
-                <a:effectLst/>
-                <a:latin typeface="Cascadia Mono" panose="020B0609020000020004" pitchFamily="49" charset="0"/>
-              </a:rPr>
-              <a:t>}</a:t>
+                <a:latin typeface="Cascadia Mono" panose="020B0609020000020004" pitchFamily="49" charset="0"/>
+              </a:rPr>
+              <a:t>   </a:t>
+            </a:r>
+            <a:r>
+              <a:rPr lang="en-IN" sz="1800" b="0" dirty="0">
+                <a:solidFill>
+                  <a:srgbClr val="0000FF"/>
+                </a:solidFill>
+                <a:effectLst/>
+                <a:latin typeface="Cascadia Mono" panose="020B0609020000020004" pitchFamily="49" charset="0"/>
+              </a:rPr>
+              <a:t>squared key.</a:t>
+            </a:r>
+          </a:p>
+          <a:p>
+            <a:pPr marL="0" indent="0">
+              <a:buNone/>
+            </a:pPr>
+            <a:r>
+              <a:rPr lang="en-IN" sz="1800" dirty="0">
+                <a:solidFill>
+                  <a:srgbClr val="0000FF"/>
+                </a:solidFill>
+                <a:latin typeface="Cascadia Mono" panose="020B0609020000020004" pitchFamily="49" charset="0"/>
+              </a:rPr>
+              <a:t>3. Return the slice.</a:t>
             </a:r>
           </a:p>
         </p:txBody>
@@ -28947,6 +27634,25 @@
               <a:buNone/>
             </a:pPr>
             <a:r>
+              <a:rPr lang="en-US" sz="1800" dirty="0" err="1">
+                <a:solidFill>
+                  <a:srgbClr val="0000FF"/>
+                </a:solidFill>
+                <a:latin typeface="Cascadia Mono" panose="020B0609020000020004" pitchFamily="49" charset="0"/>
+              </a:rPr>
+              <a:t>f</a:t>
+            </a:r>
+            <a:r>
+              <a:rPr lang="en-US" sz="1800" b="0" dirty="0" err="1">
+                <a:solidFill>
+                  <a:srgbClr val="0000FF"/>
+                </a:solidFill>
+                <a:effectLst/>
+                <a:latin typeface="Cascadia Mono" panose="020B0609020000020004" pitchFamily="49" charset="0"/>
+              </a:rPr>
+              <a:t>olding_method</a:t>
+            </a:r>
+            <a:r>
               <a:rPr lang="en-US" sz="1800" b="0" dirty="0">
                 <a:solidFill>
                   <a:srgbClr val="0000FF"/>
@@ -28954,38 +27660,80 @@
                 <a:effectLst/>
                 <a:latin typeface="Cascadia Mono" panose="020B0609020000020004" pitchFamily="49" charset="0"/>
               </a:rPr>
-              <a:t>int</a:t>
-            </a:r>
+              <a:t>: key</a:t>
+            </a:r>
+          </a:p>
+          <a:p>
+            <a:pPr marL="0" indent="0">
+              <a:buNone/>
+            </a:pPr>
+            <a:r>
+              <a:rPr lang="en-US" sz="1800" dirty="0">
+                <a:solidFill>
+                  <a:srgbClr val="0000FF"/>
+                </a:solidFill>
+                <a:latin typeface="Cascadia Mono" panose="020B0609020000020004" pitchFamily="49" charset="0"/>
+              </a:rPr>
+              <a:t>1. Select a partition size (:= m).</a:t>
+            </a:r>
+          </a:p>
+          <a:p>
+            <a:pPr marL="0" indent="0">
+              <a:buNone/>
+            </a:pPr>
             <a:r>
               <a:rPr lang="en-US" sz="1800" b="0" dirty="0">
                 <a:solidFill>
-                  <a:srgbClr val="000000"/>
-                </a:solidFill>
-                <a:effectLst/>
-                <a:latin typeface="Cascadia Mono" panose="020B0609020000020004" pitchFamily="49" charset="0"/>
-              </a:rPr>
-              <a:t> </a:t>
-            </a:r>
-            <a:r>
-              <a:rPr lang="en-US" sz="1800" b="0" dirty="0" err="1">
-                <a:solidFill>
-                  <a:srgbClr val="795E26"/>
-                </a:solidFill>
-                <a:effectLst/>
-                <a:latin typeface="Cascadia Mono" panose="020B0609020000020004" pitchFamily="49" charset="0"/>
-              </a:rPr>
-              <a:t>folding_method</a:t>
-            </a:r>
+                  <a:srgbClr val="0000FF"/>
+                </a:solidFill>
+                <a:effectLst/>
+                <a:latin typeface="Cascadia Mono" panose="020B0609020000020004" pitchFamily="49" charset="0"/>
+              </a:rPr>
+              <a:t>2. Wh</a:t>
+            </a:r>
+            <a:r>
+              <a:rPr lang="en-US" sz="1800" dirty="0">
+                <a:solidFill>
+                  <a:srgbClr val="0000FF"/>
+                </a:solidFill>
+                <a:latin typeface="Cascadia Mono" panose="020B0609020000020004" pitchFamily="49" charset="0"/>
+              </a:rPr>
+              <a:t>ile key is not 0</a:t>
+            </a:r>
+          </a:p>
+          <a:p>
+            <a:pPr marL="0" indent="0">
+              <a:buNone/>
+            </a:pPr>
             <a:r>
               <a:rPr lang="en-US" sz="1800" b="0" dirty="0">
                 <a:solidFill>
-                  <a:srgbClr val="000000"/>
-                </a:solidFill>
-                <a:effectLst/>
-                <a:latin typeface="Cascadia Mono" panose="020B0609020000020004" pitchFamily="49" charset="0"/>
-              </a:rPr>
-              <a:t>(</a:t>
-            </a:r>
+                  <a:srgbClr val="0000FF"/>
+                </a:solidFill>
+                <a:effectLst/>
+                <a:latin typeface="Cascadia Mono" panose="020B0609020000020004" pitchFamily="49" charset="0"/>
+              </a:rPr>
+              <a:t>     a. Add key mod m to hash.</a:t>
+            </a:r>
+          </a:p>
+          <a:p>
+            <a:pPr marL="0" indent="0">
+              <a:buNone/>
+            </a:pPr>
+            <a:r>
+              <a:rPr lang="en-US" sz="1800" dirty="0">
+                <a:solidFill>
+                  <a:srgbClr val="0000FF"/>
+                </a:solidFill>
+                <a:latin typeface="Cascadia Mono" panose="020B0609020000020004" pitchFamily="49" charset="0"/>
+              </a:rPr>
+              <a:t>     b. Change key to key quotient m.</a:t>
+            </a:r>
+          </a:p>
+          <a:p>
+            <a:pPr marL="0" indent="0">
+              <a:buNone/>
+            </a:pPr>
             <a:r>
               <a:rPr lang="en-US" sz="1800" b="0" dirty="0">
                 <a:solidFill>
@@ -28994,528 +27742,15 @@
                 <a:effectLst/>
                 <a:latin typeface="Cascadia Mono" panose="020B0609020000020004" pitchFamily="49" charset="0"/>
               </a:rPr>
-              <a:t>int</a:t>
-            </a:r>
-            <a:r>
-              <a:rPr lang="en-US" sz="1800" b="0" dirty="0">
-                <a:solidFill>
-                  <a:srgbClr val="000000"/>
-                </a:solidFill>
-                <a:effectLst/>
-                <a:latin typeface="Cascadia Mono" panose="020B0609020000020004" pitchFamily="49" charset="0"/>
-              </a:rPr>
-              <a:t> </a:t>
-            </a:r>
-            <a:r>
-              <a:rPr lang="en-US" sz="1800" b="0" dirty="0">
-                <a:solidFill>
-                  <a:srgbClr val="001080"/>
-                </a:solidFill>
-                <a:effectLst/>
-                <a:latin typeface="Cascadia Mono" panose="020B0609020000020004" pitchFamily="49" charset="0"/>
-              </a:rPr>
-              <a:t>key</a:t>
-            </a:r>
-            <a:r>
-              <a:rPr lang="en-US" sz="1800" b="0" dirty="0">
-                <a:solidFill>
-                  <a:srgbClr val="000000"/>
-                </a:solidFill>
-                <a:effectLst/>
-                <a:latin typeface="Cascadia Mono" panose="020B0609020000020004" pitchFamily="49" charset="0"/>
-              </a:rPr>
-              <a:t>) {</a:t>
-            </a:r>
-          </a:p>
-          <a:p>
-            <a:pPr marL="0" indent="0">
-              <a:buNone/>
-            </a:pPr>
-            <a:r>
-              <a:rPr lang="en-US" sz="1800" b="0" dirty="0">
-                <a:solidFill>
-                  <a:srgbClr val="000000"/>
-                </a:solidFill>
-                <a:effectLst/>
-                <a:latin typeface="Cascadia Mono" panose="020B0609020000020004" pitchFamily="49" charset="0"/>
-              </a:rPr>
-              <a:t>    </a:t>
-            </a:r>
-            <a:r>
-              <a:rPr lang="en-US" sz="1800" b="0" dirty="0">
-                <a:solidFill>
-                  <a:srgbClr val="0000FF"/>
-                </a:solidFill>
-                <a:effectLst/>
-                <a:latin typeface="Cascadia Mono" panose="020B0609020000020004" pitchFamily="49" charset="0"/>
-              </a:rPr>
-              <a:t>const</a:t>
-            </a:r>
-            <a:r>
-              <a:rPr lang="en-US" sz="1800" b="0" dirty="0">
-                <a:solidFill>
-                  <a:srgbClr val="000000"/>
-                </a:solidFill>
-                <a:effectLst/>
-                <a:latin typeface="Cascadia Mono" panose="020B0609020000020004" pitchFamily="49" charset="0"/>
-              </a:rPr>
-              <a:t> </a:t>
-            </a:r>
-            <a:r>
-              <a:rPr lang="en-US" sz="1800" b="0" dirty="0">
-                <a:solidFill>
-                  <a:srgbClr val="0000FF"/>
-                </a:solidFill>
-                <a:effectLst/>
-                <a:latin typeface="Cascadia Mono" panose="020B0609020000020004" pitchFamily="49" charset="0"/>
-              </a:rPr>
-              <a:t>int</a:t>
-            </a:r>
-            <a:r>
-              <a:rPr lang="en-US" sz="1800" b="0" dirty="0">
-                <a:solidFill>
-                  <a:srgbClr val="000000"/>
-                </a:solidFill>
-                <a:effectLst/>
-                <a:latin typeface="Cascadia Mono" panose="020B0609020000020004" pitchFamily="49" charset="0"/>
-              </a:rPr>
-              <a:t> </a:t>
-            </a:r>
-            <a:r>
-              <a:rPr lang="en-US" sz="1800" b="0" dirty="0" err="1">
-                <a:solidFill>
-                  <a:srgbClr val="001080"/>
-                </a:solidFill>
-                <a:effectLst/>
-                <a:latin typeface="Cascadia Mono" panose="020B0609020000020004" pitchFamily="49" charset="0"/>
-              </a:rPr>
-              <a:t>partition_size</a:t>
-            </a:r>
-            <a:r>
-              <a:rPr lang="en-US" sz="1800" b="0" dirty="0">
-                <a:solidFill>
-                  <a:srgbClr val="000000"/>
-                </a:solidFill>
-                <a:effectLst/>
-                <a:latin typeface="Cascadia Mono" panose="020B0609020000020004" pitchFamily="49" charset="0"/>
-              </a:rPr>
-              <a:t> = </a:t>
-            </a:r>
-          </a:p>
-          <a:p>
-            <a:pPr marL="0" indent="0">
-              <a:buNone/>
-            </a:pPr>
-            <a:r>
-              <a:rPr lang="en-US" sz="1800" b="0" dirty="0">
-                <a:solidFill>
-                  <a:srgbClr val="098658"/>
-                </a:solidFill>
-                <a:effectLst/>
-                <a:latin typeface="Cascadia Mono" panose="020B0609020000020004" pitchFamily="49" charset="0"/>
-              </a:rPr>
-              <a:t>100</a:t>
-            </a:r>
-            <a:r>
-              <a:rPr lang="en-US" sz="1800" b="0" dirty="0">
-                <a:solidFill>
-                  <a:srgbClr val="000000"/>
-                </a:solidFill>
-                <a:effectLst/>
-                <a:latin typeface="Cascadia Mono" panose="020B0609020000020004" pitchFamily="49" charset="0"/>
-              </a:rPr>
-              <a:t>;</a:t>
-            </a:r>
-          </a:p>
-          <a:p>
-            <a:pPr marL="0" indent="0">
-              <a:buNone/>
-            </a:pPr>
-            <a:r>
-              <a:rPr lang="en-US" sz="1800" b="0" dirty="0">
-                <a:solidFill>
-                  <a:srgbClr val="000000"/>
-                </a:solidFill>
-                <a:effectLst/>
-                <a:latin typeface="Cascadia Mono" panose="020B0609020000020004" pitchFamily="49" charset="0"/>
-              </a:rPr>
-              <a:t>    </a:t>
-            </a:r>
-            <a:r>
-              <a:rPr lang="en-US" sz="1800" b="0" dirty="0">
-                <a:solidFill>
-                  <a:srgbClr val="0000FF"/>
-                </a:solidFill>
-                <a:effectLst/>
-                <a:latin typeface="Cascadia Mono" panose="020B0609020000020004" pitchFamily="49" charset="0"/>
-              </a:rPr>
-              <a:t>int</a:t>
-            </a:r>
-            <a:r>
-              <a:rPr lang="en-US" sz="1800" b="0" dirty="0">
-                <a:solidFill>
-                  <a:srgbClr val="000000"/>
-                </a:solidFill>
-                <a:effectLst/>
-                <a:latin typeface="Cascadia Mono" panose="020B0609020000020004" pitchFamily="49" charset="0"/>
-              </a:rPr>
-              <a:t> </a:t>
-            </a:r>
-            <a:r>
-              <a:rPr lang="en-US" sz="1800" b="0" dirty="0">
-                <a:solidFill>
-                  <a:srgbClr val="001080"/>
-                </a:solidFill>
-                <a:effectLst/>
-                <a:latin typeface="Cascadia Mono" panose="020B0609020000020004" pitchFamily="49" charset="0"/>
-              </a:rPr>
-              <a:t>hash</a:t>
-            </a:r>
-            <a:r>
-              <a:rPr lang="en-US" sz="1800" b="0" dirty="0">
-                <a:solidFill>
-                  <a:srgbClr val="000000"/>
-                </a:solidFill>
-                <a:effectLst/>
-                <a:latin typeface="Cascadia Mono" panose="020B0609020000020004" pitchFamily="49" charset="0"/>
-              </a:rPr>
-              <a:t> = </a:t>
-            </a:r>
-            <a:r>
-              <a:rPr lang="en-US" sz="1800" b="0" dirty="0">
-                <a:solidFill>
-                  <a:srgbClr val="098658"/>
-                </a:solidFill>
-                <a:effectLst/>
-                <a:latin typeface="Cascadia Mono" panose="020B0609020000020004" pitchFamily="49" charset="0"/>
-              </a:rPr>
-              <a:t>0</a:t>
-            </a:r>
-            <a:r>
-              <a:rPr lang="en-US" sz="1800" b="0" dirty="0">
-                <a:solidFill>
-                  <a:srgbClr val="000000"/>
-                </a:solidFill>
-                <a:effectLst/>
-                <a:latin typeface="Cascadia Mono" panose="020B0609020000020004" pitchFamily="49" charset="0"/>
-              </a:rPr>
-              <a:t>;</a:t>
-            </a:r>
-          </a:p>
-          <a:p>
-            <a:pPr marL="0" indent="0">
-              <a:buNone/>
-            </a:pPr>
-            <a:r>
-              <a:rPr lang="en-US" sz="1800" b="0" dirty="0">
-                <a:solidFill>
-                  <a:srgbClr val="000000"/>
-                </a:solidFill>
-                <a:effectLst/>
-                <a:latin typeface="Cascadia Mono" panose="020B0609020000020004" pitchFamily="49" charset="0"/>
-              </a:rPr>
-              <a:t>    </a:t>
-            </a:r>
-            <a:r>
-              <a:rPr lang="en-US" sz="1800" b="0" dirty="0">
-                <a:solidFill>
-                  <a:srgbClr val="AF00DB"/>
-                </a:solidFill>
-                <a:effectLst/>
-                <a:latin typeface="Cascadia Mono" panose="020B0609020000020004" pitchFamily="49" charset="0"/>
-              </a:rPr>
-              <a:t>while</a:t>
-            </a:r>
-            <a:r>
-              <a:rPr lang="en-US" sz="1800" b="0" dirty="0">
-                <a:solidFill>
-                  <a:srgbClr val="000000"/>
-                </a:solidFill>
-                <a:effectLst/>
-                <a:latin typeface="Cascadia Mono" panose="020B0609020000020004" pitchFamily="49" charset="0"/>
-              </a:rPr>
-              <a:t> (</a:t>
-            </a:r>
-            <a:r>
-              <a:rPr lang="en-US" sz="1800" b="0" dirty="0">
-                <a:solidFill>
-                  <a:srgbClr val="001080"/>
-                </a:solidFill>
-                <a:effectLst/>
-                <a:latin typeface="Cascadia Mono" panose="020B0609020000020004" pitchFamily="49" charset="0"/>
-              </a:rPr>
-              <a:t>key</a:t>
-            </a:r>
-            <a:r>
-              <a:rPr lang="en-US" sz="1800" b="0" dirty="0">
-                <a:solidFill>
-                  <a:srgbClr val="000000"/>
-                </a:solidFill>
-                <a:effectLst/>
-                <a:latin typeface="Cascadia Mono" panose="020B0609020000020004" pitchFamily="49" charset="0"/>
-              </a:rPr>
-              <a:t> &gt; </a:t>
-            </a:r>
-            <a:r>
-              <a:rPr lang="en-US" sz="1800" b="0" dirty="0">
-                <a:solidFill>
-                  <a:srgbClr val="098658"/>
-                </a:solidFill>
-                <a:effectLst/>
-                <a:latin typeface="Cascadia Mono" panose="020B0609020000020004" pitchFamily="49" charset="0"/>
-              </a:rPr>
-              <a:t>0</a:t>
-            </a:r>
-            <a:r>
-              <a:rPr lang="en-US" sz="1800" b="0" dirty="0">
-                <a:solidFill>
-                  <a:srgbClr val="000000"/>
-                </a:solidFill>
-                <a:effectLst/>
-                <a:latin typeface="Cascadia Mono" panose="020B0609020000020004" pitchFamily="49" charset="0"/>
-              </a:rPr>
-              <a:t>) {</a:t>
-            </a:r>
-          </a:p>
-          <a:p>
-            <a:pPr marL="0" indent="0">
-              <a:buNone/>
-            </a:pPr>
-            <a:r>
-              <a:rPr lang="en-US" sz="1800" b="0" dirty="0">
-                <a:solidFill>
-                  <a:srgbClr val="000000"/>
-                </a:solidFill>
-                <a:effectLst/>
-                <a:latin typeface="Cascadia Mono" panose="020B0609020000020004" pitchFamily="49" charset="0"/>
-              </a:rPr>
-              <a:t>        </a:t>
-            </a:r>
-            <a:r>
-              <a:rPr lang="en-US" sz="1800" b="0" dirty="0">
-                <a:solidFill>
-                  <a:srgbClr val="001080"/>
-                </a:solidFill>
-                <a:effectLst/>
-                <a:latin typeface="Cascadia Mono" panose="020B0609020000020004" pitchFamily="49" charset="0"/>
-              </a:rPr>
-              <a:t>hash</a:t>
-            </a:r>
-            <a:r>
-              <a:rPr lang="en-US" sz="1800" b="0" dirty="0">
-                <a:solidFill>
-                  <a:srgbClr val="000000"/>
-                </a:solidFill>
-                <a:effectLst/>
-                <a:latin typeface="Cascadia Mono" panose="020B0609020000020004" pitchFamily="49" charset="0"/>
-              </a:rPr>
-              <a:t> += </a:t>
-            </a:r>
-            <a:r>
-              <a:rPr lang="en-US" sz="1800" b="0" dirty="0">
-                <a:solidFill>
-                  <a:srgbClr val="001080"/>
-                </a:solidFill>
-                <a:effectLst/>
-                <a:latin typeface="Cascadia Mono" panose="020B0609020000020004" pitchFamily="49" charset="0"/>
-              </a:rPr>
-              <a:t>key</a:t>
-            </a:r>
-            <a:r>
-              <a:rPr lang="en-US" sz="1800" b="0" dirty="0">
-                <a:solidFill>
-                  <a:srgbClr val="000000"/>
-                </a:solidFill>
-                <a:effectLst/>
-                <a:latin typeface="Cascadia Mono" panose="020B0609020000020004" pitchFamily="49" charset="0"/>
-              </a:rPr>
-              <a:t> % </a:t>
-            </a:r>
-          </a:p>
-          <a:p>
-            <a:pPr marL="0" indent="0">
-              <a:buNone/>
-            </a:pPr>
-            <a:r>
-              <a:rPr lang="en-US" sz="1800" b="0" dirty="0" err="1">
-                <a:solidFill>
-                  <a:srgbClr val="001080"/>
-                </a:solidFill>
-                <a:effectLst/>
-                <a:latin typeface="Cascadia Mono" panose="020B0609020000020004" pitchFamily="49" charset="0"/>
-              </a:rPr>
-              <a:t>partition_size</a:t>
-            </a:r>
-            <a:r>
-              <a:rPr lang="en-US" sz="1800" b="0" dirty="0">
-                <a:solidFill>
-                  <a:srgbClr val="000000"/>
-                </a:solidFill>
-                <a:effectLst/>
-                <a:latin typeface="Cascadia Mono" panose="020B0609020000020004" pitchFamily="49" charset="0"/>
-              </a:rPr>
-              <a:t>;</a:t>
-            </a:r>
-          </a:p>
-          <a:p>
-            <a:pPr marL="0" indent="0">
-              <a:buNone/>
-            </a:pPr>
-            <a:r>
-              <a:rPr lang="en-US" sz="1800" b="0" dirty="0">
-                <a:solidFill>
-                  <a:srgbClr val="000000"/>
-                </a:solidFill>
-                <a:effectLst/>
-                <a:latin typeface="Cascadia Mono" panose="020B0609020000020004" pitchFamily="49" charset="0"/>
-              </a:rPr>
-              <a:t>        </a:t>
-            </a:r>
-            <a:r>
-              <a:rPr lang="en-US" sz="1800" b="0" dirty="0">
-                <a:solidFill>
-                  <a:srgbClr val="001080"/>
-                </a:solidFill>
-                <a:effectLst/>
-                <a:latin typeface="Cascadia Mono" panose="020B0609020000020004" pitchFamily="49" charset="0"/>
-              </a:rPr>
-              <a:t>key</a:t>
-            </a:r>
-            <a:r>
-              <a:rPr lang="en-US" sz="1800" b="0" dirty="0">
-                <a:solidFill>
-                  <a:srgbClr val="000000"/>
-                </a:solidFill>
-                <a:effectLst/>
-                <a:latin typeface="Cascadia Mono" panose="020B0609020000020004" pitchFamily="49" charset="0"/>
-              </a:rPr>
-              <a:t> /= </a:t>
-            </a:r>
-            <a:r>
-              <a:rPr lang="en-US" sz="1800" b="0" dirty="0" err="1">
-                <a:solidFill>
-                  <a:srgbClr val="001080"/>
-                </a:solidFill>
-                <a:effectLst/>
-                <a:latin typeface="Cascadia Mono" panose="020B0609020000020004" pitchFamily="49" charset="0"/>
-              </a:rPr>
-              <a:t>partition_size</a:t>
-            </a:r>
-            <a:r>
-              <a:rPr lang="en-US" sz="1800" b="0" dirty="0">
-                <a:solidFill>
-                  <a:srgbClr val="000000"/>
-                </a:solidFill>
-                <a:effectLst/>
-                <a:latin typeface="Cascadia Mono" panose="020B0609020000020004" pitchFamily="49" charset="0"/>
-              </a:rPr>
-              <a:t>;</a:t>
-            </a:r>
-          </a:p>
-          <a:p>
-            <a:pPr marL="0" indent="0">
-              <a:buNone/>
-            </a:pPr>
-            <a:r>
-              <a:rPr lang="en-US" sz="1800" b="0" dirty="0">
-                <a:solidFill>
-                  <a:srgbClr val="000000"/>
-                </a:solidFill>
-                <a:effectLst/>
-                <a:latin typeface="Cascadia Mono" panose="020B0609020000020004" pitchFamily="49" charset="0"/>
-              </a:rPr>
-              <a:t>    }</a:t>
-            </a:r>
-          </a:p>
-          <a:p>
-            <a:pPr marL="0" indent="0">
-              <a:buNone/>
-            </a:pPr>
-            <a:r>
-              <a:rPr lang="en-US" sz="1800" b="0" dirty="0">
-                <a:solidFill>
-                  <a:srgbClr val="000000"/>
-                </a:solidFill>
-                <a:effectLst/>
-                <a:latin typeface="Cascadia Mono" panose="020B0609020000020004" pitchFamily="49" charset="0"/>
-              </a:rPr>
-              <a:t>    </a:t>
-            </a:r>
-            <a:r>
-              <a:rPr lang="en-US" sz="1800" b="0" dirty="0">
-                <a:solidFill>
-                  <a:srgbClr val="AF00DB"/>
-                </a:solidFill>
-                <a:effectLst/>
-                <a:latin typeface="Cascadia Mono" panose="020B0609020000020004" pitchFamily="49" charset="0"/>
-              </a:rPr>
-              <a:t>return</a:t>
-            </a:r>
-            <a:r>
-              <a:rPr lang="en-US" sz="1800" b="0" dirty="0">
-                <a:solidFill>
-                  <a:srgbClr val="000000"/>
-                </a:solidFill>
-                <a:effectLst/>
-                <a:latin typeface="Cascadia Mono" panose="020B0609020000020004" pitchFamily="49" charset="0"/>
-              </a:rPr>
-              <a:t> </a:t>
-            </a:r>
-            <a:r>
-              <a:rPr lang="en-US" sz="1800" b="0" dirty="0">
-                <a:solidFill>
-                  <a:srgbClr val="001080"/>
-                </a:solidFill>
-                <a:effectLst/>
-                <a:latin typeface="Cascadia Mono" panose="020B0609020000020004" pitchFamily="49" charset="0"/>
-              </a:rPr>
-              <a:t>hash</a:t>
-            </a:r>
-            <a:r>
-              <a:rPr lang="en-US" sz="1800" b="0" dirty="0">
-                <a:solidFill>
-                  <a:srgbClr val="000000"/>
-                </a:solidFill>
-                <a:effectLst/>
-                <a:latin typeface="Cascadia Mono" panose="020B0609020000020004" pitchFamily="49" charset="0"/>
-              </a:rPr>
-              <a:t> % </a:t>
-            </a:r>
-            <a:r>
-              <a:rPr lang="en-US" sz="1800" b="0" dirty="0" err="1">
-                <a:solidFill>
-                  <a:srgbClr val="001080"/>
-                </a:solidFill>
-                <a:effectLst/>
-                <a:latin typeface="Cascadia Mono" panose="020B0609020000020004" pitchFamily="49" charset="0"/>
-              </a:rPr>
-              <a:t>partition_size</a:t>
-            </a:r>
-            <a:r>
-              <a:rPr lang="en-US" sz="1800" b="0" dirty="0">
-                <a:solidFill>
-                  <a:srgbClr val="000000"/>
-                </a:solidFill>
-                <a:effectLst/>
-                <a:latin typeface="Cascadia Mono" panose="020B0609020000020004" pitchFamily="49" charset="0"/>
-              </a:rPr>
-              <a:t>;</a:t>
-            </a:r>
-          </a:p>
-          <a:p>
-            <a:pPr marL="0" indent="0">
-              <a:buNone/>
-            </a:pPr>
-            <a:r>
-              <a:rPr lang="en-US" sz="1800" b="0" dirty="0">
-                <a:solidFill>
-                  <a:srgbClr val="000000"/>
-                </a:solidFill>
-                <a:effectLst/>
-                <a:latin typeface="Cascadia Mono" panose="020B0609020000020004" pitchFamily="49" charset="0"/>
-              </a:rPr>
-              <a:t>}</a:t>
-            </a:r>
+              <a:t>3. Return key mod m.</a:t>
+            </a:r>
+            <a:endParaRPr lang="en-US" sz="1800" b="0" dirty="0">
+              <a:solidFill>
+                <a:srgbClr val="000000"/>
+              </a:solidFill>
+              <a:effectLst/>
+              <a:latin typeface="Cascadia Mono" panose="020B0609020000020004" pitchFamily="49" charset="0"/>
+            </a:endParaRPr>
           </a:p>
           <a:p>
             <a:endParaRPr lang="en-IN" sz="1800" dirty="0"/>
@@ -29785,7 +28020,7 @@
                 <a:effectLst/>
                 <a:latin typeface="Cascadia Mono" panose="020B0609020000020004" pitchFamily="49" charset="0"/>
               </a:rPr>
-              <a:t>uint</a:t>
+              <a:t>bsd_checksum</a:t>
             </a:r>
             <a:r>
               <a:rPr lang="en-US" sz="1900" b="0" dirty="0">
@@ -29795,587 +28030,130 @@
                 <a:effectLst/>
                 <a:latin typeface="Cascadia Mono" panose="020B0609020000020004" pitchFamily="49" charset="0"/>
               </a:rPr>
-              <a:t> </a:t>
-            </a:r>
-            <a:r>
-              <a:rPr lang="en-US" sz="1900" b="0" dirty="0" err="1">
-                <a:solidFill>
-                  <a:srgbClr val="795E26"/>
-                </a:solidFill>
-                <a:effectLst/>
-                <a:latin typeface="Cascadia Mono" panose="020B0609020000020004" pitchFamily="49" charset="0"/>
-              </a:rPr>
-              <a:t>bsd_checksum</a:t>
-            </a:r>
+              <a:t>: key</a:t>
+            </a:r>
+          </a:p>
+          <a:p>
+            <a:pPr marL="457200" indent="-457200">
+              <a:buAutoNum type="arabicPeriod"/>
+            </a:pPr>
+            <a:r>
+              <a:rPr lang="en-US" sz="1900" dirty="0">
+                <a:solidFill>
+                  <a:srgbClr val="267F99"/>
+                </a:solidFill>
+                <a:latin typeface="Cascadia Mono" panose="020B0609020000020004" pitchFamily="49" charset="0"/>
+              </a:rPr>
+              <a:t>While the character at key is</a:t>
+            </a:r>
+          </a:p>
+          <a:p>
+            <a:pPr marL="0" indent="0">
+              <a:buNone/>
+            </a:pPr>
             <a:r>
               <a:rPr lang="en-US" sz="1900" b="0" dirty="0">
                 <a:solidFill>
-                  <a:srgbClr val="000000"/>
-                </a:solidFill>
-                <a:effectLst/>
-                <a:latin typeface="Cascadia Mono" panose="020B0609020000020004" pitchFamily="49" charset="0"/>
-              </a:rPr>
-              <a:t>(</a:t>
-            </a:r>
+                  <a:srgbClr val="267F99"/>
+                </a:solidFill>
+                <a:effectLst/>
+                <a:latin typeface="Cascadia Mono" panose="020B0609020000020004" pitchFamily="49" charset="0"/>
+              </a:rPr>
+              <a:t>   not null character</a:t>
+            </a:r>
+          </a:p>
+          <a:p>
+            <a:pPr marL="0" indent="0">
+              <a:buNone/>
+            </a:pPr>
+            <a:r>
+              <a:rPr lang="en-US" sz="1900" dirty="0">
+                <a:solidFill>
+                  <a:srgbClr val="267F99"/>
+                </a:solidFill>
+                <a:latin typeface="Cascadia Mono" panose="020B0609020000020004" pitchFamily="49" charset="0"/>
+              </a:rPr>
+              <a:t>     a. Circular shift hash by a </a:t>
+            </a:r>
+          </a:p>
+          <a:p>
+            <a:pPr marL="0" indent="0">
+              <a:buNone/>
+            </a:pPr>
+            <a:r>
+              <a:rPr lang="en-US" sz="1900" dirty="0">
+                <a:solidFill>
+                  <a:srgbClr val="267F99"/>
+                </a:solidFill>
+                <a:latin typeface="Cascadia Mono" panose="020B0609020000020004" pitchFamily="49" charset="0"/>
+              </a:rPr>
+              <a:t>        bit.</a:t>
+            </a:r>
+          </a:p>
+          <a:p>
+            <a:pPr marL="0" indent="0">
+              <a:buNone/>
+            </a:pPr>
+            <a:r>
+              <a:rPr lang="en-US" sz="1900" dirty="0">
+                <a:solidFill>
+                  <a:srgbClr val="267F99"/>
+                </a:solidFill>
+                <a:latin typeface="Cascadia Mono" panose="020B0609020000020004" pitchFamily="49" charset="0"/>
+              </a:rPr>
+              <a:t>     b. Add the ascii of the</a:t>
+            </a:r>
+          </a:p>
+          <a:p>
+            <a:pPr marL="0" indent="0">
+              <a:buNone/>
+            </a:pPr>
             <a:r>
               <a:rPr lang="en-US" sz="1900" b="0" dirty="0">
                 <a:solidFill>
-                  <a:srgbClr val="0000FF"/>
-                </a:solidFill>
-                <a:effectLst/>
-                <a:latin typeface="Cascadia Mono" panose="020B0609020000020004" pitchFamily="49" charset="0"/>
-              </a:rPr>
-              <a:t>const</a:t>
-            </a:r>
+                  <a:srgbClr val="267F99"/>
+                </a:solidFill>
+                <a:effectLst/>
+                <a:latin typeface="Cascadia Mono" panose="020B0609020000020004" pitchFamily="49" charset="0"/>
+              </a:rPr>
+              <a:t>        character to hash.</a:t>
+            </a:r>
+          </a:p>
+          <a:p>
+            <a:pPr marL="0" indent="0">
+              <a:buNone/>
+            </a:pPr>
+            <a:r>
+              <a:rPr lang="en-US" sz="1900" dirty="0">
+                <a:solidFill>
+                  <a:srgbClr val="267F99"/>
+                </a:solidFill>
+                <a:latin typeface="Cascadia Mono" panose="020B0609020000020004" pitchFamily="49" charset="0"/>
+              </a:rPr>
+              <a:t>     c. Mask the hash.</a:t>
+            </a:r>
+          </a:p>
+          <a:p>
+            <a:pPr marL="0" indent="0">
+              <a:buNone/>
+            </a:pPr>
             <a:r>
               <a:rPr lang="en-US" sz="1900" b="0" dirty="0">
                 <a:solidFill>
-                  <a:srgbClr val="000000"/>
-                </a:solidFill>
-                <a:effectLst/>
-                <a:latin typeface="Cascadia Mono" panose="020B0609020000020004" pitchFamily="49" charset="0"/>
-              </a:rPr>
-              <a:t> </a:t>
-            </a:r>
-          </a:p>
-          <a:p>
-            <a:pPr marL="0" indent="0">
-              <a:buNone/>
-            </a:pPr>
-            <a:r>
-              <a:rPr lang="en-US" sz="1900" b="0" dirty="0">
-                <a:solidFill>
-                  <a:srgbClr val="0000FF"/>
-                </a:solidFill>
-                <a:effectLst/>
-                <a:latin typeface="Cascadia Mono" panose="020B0609020000020004" pitchFamily="49" charset="0"/>
-              </a:rPr>
-              <a:t>char</a:t>
-            </a:r>
-            <a:r>
-              <a:rPr lang="en-US" sz="1900" b="0" dirty="0">
-                <a:solidFill>
-                  <a:srgbClr val="000000"/>
-                </a:solidFill>
-                <a:effectLst/>
-                <a:latin typeface="Cascadia Mono" panose="020B0609020000020004" pitchFamily="49" charset="0"/>
-              </a:rPr>
-              <a:t> *</a:t>
-            </a:r>
-            <a:r>
-              <a:rPr lang="en-US" sz="1900" b="0" dirty="0">
-                <a:solidFill>
-                  <a:srgbClr val="001080"/>
-                </a:solidFill>
-                <a:effectLst/>
-                <a:latin typeface="Cascadia Mono" panose="020B0609020000020004" pitchFamily="49" charset="0"/>
-              </a:rPr>
-              <a:t>key</a:t>
-            </a:r>
-            <a:r>
-              <a:rPr lang="en-US" sz="1900" b="0" dirty="0">
-                <a:solidFill>
-                  <a:srgbClr val="000000"/>
-                </a:solidFill>
-                <a:effectLst/>
-                <a:latin typeface="Cascadia Mono" panose="020B0609020000020004" pitchFamily="49" charset="0"/>
-              </a:rPr>
-              <a:t>) {</a:t>
-            </a:r>
-          </a:p>
-          <a:p>
-            <a:pPr marL="0" indent="0">
-              <a:buNone/>
-            </a:pPr>
-            <a:r>
-              <a:rPr lang="en-US" sz="1900" b="0" dirty="0">
-                <a:solidFill>
-                  <a:srgbClr val="000000"/>
-                </a:solidFill>
-                <a:effectLst/>
-                <a:latin typeface="Cascadia Mono" panose="020B0609020000020004" pitchFamily="49" charset="0"/>
-              </a:rPr>
-              <a:t>    </a:t>
-            </a:r>
-            <a:r>
-              <a:rPr lang="en-US" sz="1900" b="0" dirty="0" err="1">
-                <a:solidFill>
                   <a:srgbClr val="267F99"/>
                 </a:solidFill>
                 <a:effectLst/>
                 <a:latin typeface="Cascadia Mono" panose="020B0609020000020004" pitchFamily="49" charset="0"/>
               </a:rPr>
-              <a:t>uint</a:t>
-            </a:r>
-            <a:r>
-              <a:rPr lang="en-US" sz="1900" b="0" dirty="0">
-                <a:solidFill>
-                  <a:srgbClr val="000000"/>
-                </a:solidFill>
-                <a:effectLst/>
-                <a:latin typeface="Cascadia Mono" panose="020B0609020000020004" pitchFamily="49" charset="0"/>
-              </a:rPr>
-              <a:t> </a:t>
-            </a:r>
-            <a:r>
-              <a:rPr lang="en-US" sz="1900" b="0" dirty="0">
-                <a:solidFill>
-                  <a:srgbClr val="001080"/>
-                </a:solidFill>
-                <a:effectLst/>
-                <a:latin typeface="Cascadia Mono" panose="020B0609020000020004" pitchFamily="49" charset="0"/>
-              </a:rPr>
-              <a:t>hash</a:t>
-            </a:r>
-            <a:r>
-              <a:rPr lang="en-US" sz="1900" b="0" dirty="0">
-                <a:solidFill>
-                  <a:srgbClr val="000000"/>
-                </a:solidFill>
-                <a:effectLst/>
-                <a:latin typeface="Cascadia Mono" panose="020B0609020000020004" pitchFamily="49" charset="0"/>
-              </a:rPr>
-              <a:t> = </a:t>
-            </a:r>
-            <a:r>
-              <a:rPr lang="en-US" sz="1900" b="0" dirty="0">
-                <a:solidFill>
-                  <a:srgbClr val="098658"/>
-                </a:solidFill>
-                <a:effectLst/>
-                <a:latin typeface="Cascadia Mono" panose="020B0609020000020004" pitchFamily="49" charset="0"/>
-              </a:rPr>
-              <a:t>0</a:t>
-            </a:r>
-            <a:r>
-              <a:rPr lang="en-US" sz="1900" b="0" dirty="0">
-                <a:solidFill>
-                  <a:srgbClr val="000000"/>
-                </a:solidFill>
-                <a:effectLst/>
-                <a:latin typeface="Cascadia Mono" panose="020B0609020000020004" pitchFamily="49" charset="0"/>
-              </a:rPr>
-              <a:t>;</a:t>
-            </a:r>
-          </a:p>
-          <a:p>
-            <a:pPr marL="0" indent="0">
-              <a:buNone/>
-            </a:pPr>
-            <a:r>
-              <a:rPr lang="en-US" sz="1900" b="0" dirty="0">
-                <a:solidFill>
-                  <a:srgbClr val="000000"/>
-                </a:solidFill>
-                <a:effectLst/>
-                <a:latin typeface="Cascadia Mono" panose="020B0609020000020004" pitchFamily="49" charset="0"/>
-              </a:rPr>
-              <a:t>    </a:t>
-            </a:r>
-            <a:r>
-              <a:rPr lang="en-US" sz="1900" b="0" dirty="0">
-                <a:solidFill>
-                  <a:srgbClr val="AF00DB"/>
-                </a:solidFill>
-                <a:effectLst/>
-                <a:latin typeface="Cascadia Mono" panose="020B0609020000020004" pitchFamily="49" charset="0"/>
-              </a:rPr>
-              <a:t>while</a:t>
-            </a:r>
-            <a:r>
-              <a:rPr lang="en-US" sz="1900" b="0" dirty="0">
-                <a:solidFill>
-                  <a:srgbClr val="000000"/>
-                </a:solidFill>
-                <a:effectLst/>
-                <a:latin typeface="Cascadia Mono" panose="020B0609020000020004" pitchFamily="49" charset="0"/>
-              </a:rPr>
-              <a:t> (*</a:t>
-            </a:r>
-            <a:r>
-              <a:rPr lang="en-US" sz="1900" b="0" dirty="0">
-                <a:solidFill>
-                  <a:srgbClr val="001080"/>
-                </a:solidFill>
-                <a:effectLst/>
-                <a:latin typeface="Cascadia Mono" panose="020B0609020000020004" pitchFamily="49" charset="0"/>
-              </a:rPr>
-              <a:t>key</a:t>
-            </a:r>
-            <a:r>
-              <a:rPr lang="en-US" sz="1900" b="0" dirty="0">
-                <a:solidFill>
-                  <a:srgbClr val="000000"/>
-                </a:solidFill>
-                <a:effectLst/>
-                <a:latin typeface="Cascadia Mono" panose="020B0609020000020004" pitchFamily="49" charset="0"/>
-              </a:rPr>
-              <a:t>) {</a:t>
-            </a:r>
-          </a:p>
-          <a:p>
-            <a:pPr marL="0" indent="0">
-              <a:buNone/>
-            </a:pPr>
-            <a:r>
-              <a:rPr lang="en-US" sz="1900" b="0" dirty="0">
-                <a:solidFill>
-                  <a:srgbClr val="000000"/>
-                </a:solidFill>
-                <a:effectLst/>
-                <a:latin typeface="Cascadia Mono" panose="020B0609020000020004" pitchFamily="49" charset="0"/>
-              </a:rPr>
-              <a:t>        </a:t>
-            </a:r>
-            <a:r>
-              <a:rPr lang="en-US" sz="1900" b="0" dirty="0">
-                <a:solidFill>
-                  <a:srgbClr val="001080"/>
-                </a:solidFill>
-                <a:effectLst/>
-                <a:latin typeface="Cascadia Mono" panose="020B0609020000020004" pitchFamily="49" charset="0"/>
-              </a:rPr>
-              <a:t>hash</a:t>
-            </a:r>
-            <a:r>
-              <a:rPr lang="en-US" sz="1900" b="0" dirty="0">
-                <a:solidFill>
-                  <a:srgbClr val="000000"/>
-                </a:solidFill>
-                <a:effectLst/>
-                <a:latin typeface="Cascadia Mono" panose="020B0609020000020004" pitchFamily="49" charset="0"/>
-              </a:rPr>
-              <a:t> = (</a:t>
-            </a:r>
-            <a:r>
-              <a:rPr lang="en-US" sz="1900" b="0" dirty="0">
-                <a:solidFill>
-                  <a:srgbClr val="001080"/>
-                </a:solidFill>
-                <a:effectLst/>
-                <a:latin typeface="Cascadia Mono" panose="020B0609020000020004" pitchFamily="49" charset="0"/>
-              </a:rPr>
-              <a:t>hash</a:t>
-            </a:r>
-            <a:r>
-              <a:rPr lang="en-US" sz="1900" b="0" dirty="0">
-                <a:solidFill>
-                  <a:srgbClr val="000000"/>
-                </a:solidFill>
-                <a:effectLst/>
-                <a:latin typeface="Cascadia Mono" panose="020B0609020000020004" pitchFamily="49" charset="0"/>
-              </a:rPr>
-              <a:t> &gt;&gt; </a:t>
-            </a:r>
-            <a:r>
-              <a:rPr lang="en-US" sz="1900" b="0" dirty="0">
-                <a:solidFill>
-                  <a:srgbClr val="098658"/>
-                </a:solidFill>
-                <a:effectLst/>
-                <a:latin typeface="Cascadia Mono" panose="020B0609020000020004" pitchFamily="49" charset="0"/>
-              </a:rPr>
-              <a:t>1</a:t>
-            </a:r>
-            <a:r>
-              <a:rPr lang="en-US" sz="1900" b="0" dirty="0">
-                <a:solidFill>
-                  <a:srgbClr val="000000"/>
-                </a:solidFill>
-                <a:effectLst/>
-                <a:latin typeface="Cascadia Mono" panose="020B0609020000020004" pitchFamily="49" charset="0"/>
-              </a:rPr>
-              <a:t>) </a:t>
-            </a:r>
-            <a:r>
-              <a:rPr lang="en-US" sz="1900" dirty="0">
-                <a:solidFill>
-                  <a:srgbClr val="000000"/>
-                </a:solidFill>
-                <a:latin typeface="Cascadia Mono" panose="020B0609020000020004" pitchFamily="49" charset="0"/>
-              </a:rPr>
-              <a:t>|</a:t>
-            </a:r>
-            <a:r>
-              <a:rPr lang="en-US" sz="1900" b="0" dirty="0">
-                <a:solidFill>
-                  <a:srgbClr val="000000"/>
-                </a:solidFill>
-                <a:effectLst/>
-                <a:latin typeface="Cascadia Mono" panose="020B0609020000020004" pitchFamily="49" charset="0"/>
-              </a:rPr>
-              <a:t> </a:t>
-            </a:r>
-          </a:p>
-          <a:p>
-            <a:pPr marL="0" indent="0">
-              <a:buNone/>
-            </a:pPr>
-            <a:r>
-              <a:rPr lang="en-US" sz="1900" b="0" dirty="0">
-                <a:solidFill>
-                  <a:srgbClr val="000000"/>
-                </a:solidFill>
-                <a:effectLst/>
-                <a:latin typeface="Cascadia Mono" panose="020B0609020000020004" pitchFamily="49" charset="0"/>
-              </a:rPr>
-              <a:t>((</a:t>
-            </a:r>
-            <a:r>
-              <a:rPr lang="en-US" sz="1900" b="0" dirty="0">
-                <a:solidFill>
-                  <a:srgbClr val="001080"/>
-                </a:solidFill>
-                <a:effectLst/>
-                <a:latin typeface="Cascadia Mono" panose="020B0609020000020004" pitchFamily="49" charset="0"/>
-              </a:rPr>
-              <a:t>hash</a:t>
-            </a:r>
-            <a:r>
-              <a:rPr lang="en-US" sz="1900" b="0" dirty="0">
-                <a:solidFill>
-                  <a:srgbClr val="000000"/>
-                </a:solidFill>
-                <a:effectLst/>
-                <a:latin typeface="Cascadia Mono" panose="020B0609020000020004" pitchFamily="49" charset="0"/>
-              </a:rPr>
-              <a:t> &amp; </a:t>
-            </a:r>
-            <a:r>
-              <a:rPr lang="en-US" sz="1900" b="0" dirty="0">
-                <a:solidFill>
-                  <a:srgbClr val="098658"/>
-                </a:solidFill>
-                <a:effectLst/>
-                <a:latin typeface="Cascadia Mono" panose="020B0609020000020004" pitchFamily="49" charset="0"/>
-              </a:rPr>
-              <a:t>1</a:t>
-            </a:r>
-            <a:r>
-              <a:rPr lang="en-US" sz="1900" b="0" dirty="0">
-                <a:solidFill>
-                  <a:srgbClr val="000000"/>
-                </a:solidFill>
-                <a:effectLst/>
-                <a:latin typeface="Cascadia Mono" panose="020B0609020000020004" pitchFamily="49" charset="0"/>
-              </a:rPr>
-              <a:t>) &lt;&lt; </a:t>
-            </a:r>
-            <a:r>
-              <a:rPr lang="en-US" sz="1900" b="0" dirty="0">
-                <a:solidFill>
-                  <a:srgbClr val="098658"/>
-                </a:solidFill>
-                <a:effectLst/>
-                <a:latin typeface="Cascadia Mono" panose="020B0609020000020004" pitchFamily="49" charset="0"/>
-              </a:rPr>
-              <a:t>15</a:t>
-            </a:r>
-            <a:r>
-              <a:rPr lang="en-US" sz="1900" b="0" dirty="0">
-                <a:solidFill>
-                  <a:srgbClr val="000000"/>
-                </a:solidFill>
-                <a:effectLst/>
-                <a:latin typeface="Cascadia Mono" panose="020B0609020000020004" pitchFamily="49" charset="0"/>
-              </a:rPr>
-              <a:t>);</a:t>
-            </a:r>
-          </a:p>
-          <a:p>
-            <a:pPr marL="0" indent="0">
-              <a:buNone/>
-            </a:pPr>
-            <a:r>
-              <a:rPr lang="en-US" sz="1900" b="0" dirty="0">
-                <a:solidFill>
-                  <a:srgbClr val="000000"/>
-                </a:solidFill>
-                <a:effectLst/>
-                <a:latin typeface="Cascadia Mono" panose="020B0609020000020004" pitchFamily="49" charset="0"/>
-              </a:rPr>
-              <a:t>        </a:t>
-            </a:r>
-            <a:r>
-              <a:rPr lang="en-US" sz="1900" b="0" dirty="0">
-                <a:solidFill>
-                  <a:srgbClr val="001080"/>
-                </a:solidFill>
-                <a:effectLst/>
-                <a:latin typeface="Cascadia Mono" panose="020B0609020000020004" pitchFamily="49" charset="0"/>
-              </a:rPr>
-              <a:t>hash</a:t>
-            </a:r>
-            <a:r>
-              <a:rPr lang="en-US" sz="1900" b="0" dirty="0">
-                <a:solidFill>
-                  <a:srgbClr val="000000"/>
-                </a:solidFill>
-                <a:effectLst/>
-                <a:latin typeface="Cascadia Mono" panose="020B0609020000020004" pitchFamily="49" charset="0"/>
-              </a:rPr>
-              <a:t> += *</a:t>
-            </a:r>
-            <a:r>
-              <a:rPr lang="en-US" sz="1900" b="0" dirty="0">
-                <a:solidFill>
-                  <a:srgbClr val="001080"/>
-                </a:solidFill>
-                <a:effectLst/>
-                <a:latin typeface="Cascadia Mono" panose="020B0609020000020004" pitchFamily="49" charset="0"/>
-              </a:rPr>
-              <a:t>key</a:t>
-            </a:r>
-            <a:r>
-              <a:rPr lang="en-US" sz="1900" b="0" dirty="0">
-                <a:solidFill>
-                  <a:srgbClr val="000000"/>
-                </a:solidFill>
-                <a:effectLst/>
-                <a:latin typeface="Cascadia Mono" panose="020B0609020000020004" pitchFamily="49" charset="0"/>
-              </a:rPr>
-              <a:t>++;</a:t>
-            </a:r>
-          </a:p>
-          <a:p>
-            <a:pPr marL="0" indent="0">
-              <a:buNone/>
-            </a:pPr>
-            <a:r>
-              <a:rPr lang="en-US" sz="1900" b="0" dirty="0">
-                <a:solidFill>
-                  <a:srgbClr val="000000"/>
-                </a:solidFill>
-                <a:effectLst/>
-                <a:latin typeface="Cascadia Mono" panose="020B0609020000020004" pitchFamily="49" charset="0"/>
-              </a:rPr>
-              <a:t>        </a:t>
-            </a:r>
-            <a:r>
-              <a:rPr lang="en-US" sz="1900" b="0" dirty="0">
-                <a:solidFill>
-                  <a:srgbClr val="001080"/>
-                </a:solidFill>
-                <a:effectLst/>
-                <a:latin typeface="Cascadia Mono" panose="020B0609020000020004" pitchFamily="49" charset="0"/>
-              </a:rPr>
-              <a:t>hash</a:t>
-            </a:r>
-            <a:r>
-              <a:rPr lang="en-US" sz="1900" b="0" dirty="0">
-                <a:solidFill>
-                  <a:srgbClr val="000000"/>
-                </a:solidFill>
-                <a:effectLst/>
-                <a:latin typeface="Cascadia Mono" panose="020B0609020000020004" pitchFamily="49" charset="0"/>
-              </a:rPr>
-              <a:t> &amp;= </a:t>
-            </a:r>
-            <a:r>
-              <a:rPr lang="en-US" sz="1900" b="0" dirty="0">
-                <a:solidFill>
-                  <a:srgbClr val="098658"/>
-                </a:solidFill>
-                <a:effectLst/>
-                <a:latin typeface="Cascadia Mono" panose="020B0609020000020004" pitchFamily="49" charset="0"/>
-              </a:rPr>
-              <a:t>0xffff</a:t>
-            </a:r>
-            <a:r>
-              <a:rPr lang="en-US" sz="1900" b="0" dirty="0">
-                <a:solidFill>
-                  <a:srgbClr val="000000"/>
-                </a:solidFill>
-                <a:effectLst/>
-                <a:latin typeface="Cascadia Mono" panose="020B0609020000020004" pitchFamily="49" charset="0"/>
-              </a:rPr>
-              <a:t>;</a:t>
-            </a:r>
-          </a:p>
-          <a:p>
-            <a:pPr marL="0" indent="0">
-              <a:buNone/>
-            </a:pPr>
-            <a:r>
-              <a:rPr lang="en-US" sz="1900" b="0" dirty="0">
-                <a:solidFill>
-                  <a:srgbClr val="000000"/>
-                </a:solidFill>
-                <a:effectLst/>
-                <a:latin typeface="Cascadia Mono" panose="020B0609020000020004" pitchFamily="49" charset="0"/>
-              </a:rPr>
-              <a:t>    }</a:t>
-            </a:r>
-          </a:p>
-          <a:p>
-            <a:pPr marL="0" indent="0">
-              <a:buNone/>
-            </a:pPr>
-            <a:r>
-              <a:rPr lang="en-US" sz="1900" b="0" dirty="0">
-                <a:solidFill>
-                  <a:srgbClr val="000000"/>
-                </a:solidFill>
-                <a:effectLst/>
-                <a:latin typeface="Cascadia Mono" panose="020B0609020000020004" pitchFamily="49" charset="0"/>
-              </a:rPr>
-              <a:t>    </a:t>
-            </a:r>
-            <a:r>
-              <a:rPr lang="en-US" sz="1900" b="0" dirty="0">
-                <a:solidFill>
-                  <a:srgbClr val="AF00DB"/>
-                </a:solidFill>
-                <a:effectLst/>
-                <a:latin typeface="Cascadia Mono" panose="020B0609020000020004" pitchFamily="49" charset="0"/>
-              </a:rPr>
-              <a:t>return</a:t>
-            </a:r>
-            <a:r>
-              <a:rPr lang="en-US" sz="1900" b="0" dirty="0">
-                <a:solidFill>
-                  <a:srgbClr val="000000"/>
-                </a:solidFill>
-                <a:effectLst/>
-                <a:latin typeface="Cascadia Mono" panose="020B0609020000020004" pitchFamily="49" charset="0"/>
-              </a:rPr>
-              <a:t> </a:t>
-            </a:r>
-            <a:r>
-              <a:rPr lang="en-US" sz="1900" b="0" dirty="0">
-                <a:solidFill>
-                  <a:srgbClr val="001080"/>
-                </a:solidFill>
-                <a:effectLst/>
-                <a:latin typeface="Cascadia Mono" panose="020B0609020000020004" pitchFamily="49" charset="0"/>
-              </a:rPr>
-              <a:t>hash</a:t>
-            </a:r>
-            <a:r>
-              <a:rPr lang="en-US" sz="1900" b="0" dirty="0">
-                <a:solidFill>
-                  <a:srgbClr val="000000"/>
-                </a:solidFill>
-                <a:effectLst/>
-                <a:latin typeface="Cascadia Mono" panose="020B0609020000020004" pitchFamily="49" charset="0"/>
-              </a:rPr>
-              <a:t>;</a:t>
-            </a:r>
-          </a:p>
-          <a:p>
-            <a:pPr marL="0" indent="0">
-              <a:buNone/>
-            </a:pPr>
-            <a:r>
-              <a:rPr lang="en-US" sz="1900" b="0" dirty="0">
-                <a:solidFill>
-                  <a:srgbClr val="000000"/>
-                </a:solidFill>
-                <a:effectLst/>
-                <a:latin typeface="Cascadia Mono" panose="020B0609020000020004" pitchFamily="49" charset="0"/>
-              </a:rPr>
-              <a:t>}</a:t>
-            </a:r>
+              <a:t>2. Return hash.</a:t>
+            </a:r>
+            <a:endParaRPr lang="en-US" sz="1900" b="0" dirty="0">
+              <a:solidFill>
+                <a:srgbClr val="000000"/>
+              </a:solidFill>
+              <a:effectLst/>
+              <a:latin typeface="Cascadia Mono" panose="020B0609020000020004" pitchFamily="49" charset="0"/>
+            </a:endParaRPr>
           </a:p>
           <a:p>
             <a:endParaRPr lang="en-IN" dirty="0"/>

</xml_diff>